<commit_message>
Fixed bullets, pictures and animations
</commit_message>
<xml_diff>
--- a/Courses/Computer-Modeling-and-IT/Computer-Modeling-and-IT-5-Class/03-Data-Storages/03-Data-Storages.pptx
+++ b/Courses/Computer-Modeling-and-IT/Computer-Modeling-and-IT-5-Class/03-Data-Storages/03-Data-Storages.pptx
@@ -5,10 +5,10 @@
     <p:sldMasterId id="2147483675" r:id="rId1"/>
   </p:sldMasterIdLst>
   <p:notesMasterIdLst>
-    <p:notesMasterId r:id="rId23"/>
+    <p:notesMasterId r:id="rId22"/>
   </p:notesMasterIdLst>
   <p:handoutMasterIdLst>
-    <p:handoutMasterId r:id="rId24"/>
+    <p:handoutMasterId r:id="rId23"/>
   </p:handoutMasterIdLst>
   <p:sldIdLst>
     <p:sldId id="274" r:id="rId2"/>
@@ -28,10 +28,9 @@
     <p:sldId id="592" r:id="rId16"/>
     <p:sldId id="632" r:id="rId17"/>
     <p:sldId id="633" r:id="rId18"/>
-    <p:sldId id="631" r:id="rId19"/>
-    <p:sldId id="586" r:id="rId20"/>
-    <p:sldId id="528" r:id="rId21"/>
-    <p:sldId id="400" r:id="rId22"/>
+    <p:sldId id="586" r:id="rId19"/>
+    <p:sldId id="528" r:id="rId20"/>
+    <p:sldId id="400" r:id="rId21"/>
   </p:sldIdLst>
   <p:sldSz cx="12192000" cy="6858000"/>
   <p:notesSz cx="6858000" cy="9144000"/>
@@ -164,7 +163,6 @@
             <p14:sldId id="592"/>
             <p14:sldId id="632"/>
             <p14:sldId id="633"/>
-            <p14:sldId id="631"/>
           </p14:sldIdLst>
         </p14:section>
         <p14:section name="Заключение" id="{10E03AB1-9AA8-4E86-9A64-D741901E50A2}">
@@ -310,7 +308,7 @@
           <a:p>
             <a:fld id="{4E087215-0C8F-4762-A664-737A353EC9A4}" type="datetimeFigureOut">
               <a:rPr lang="bg-BG" smtClean="0"/>
-              <a:t>26.07.23 г.</a:t>
+              <a:t>27.7.2023 г.</a:t>
             </a:fld>
             <a:endParaRPr lang="bg-BG"/>
           </a:p>
@@ -487,7 +485,7 @@
           <a:p>
             <a:fld id="{72D84649-876A-46C9-8472-14CB09C070D8}" type="datetimeFigureOut">
               <a:rPr lang="en-US" smtClean="0"/>
-              <a:t>7/26/23</a:t>
+              <a:t>7/27/2023</a:t>
             </a:fld>
             <a:endParaRPr lang="en-US"/>
           </a:p>
@@ -1017,18 +1015,18 @@
           <a:bodyPr/>
           <a:lstStyle/>
           <a:p>
-            <a:endParaRPr lang="en-BG" dirty="0"/>
+            <a:endParaRPr lang="en-US" dirty="0"/>
           </a:p>
         </p:txBody>
       </p:sp>
       <p:sp>
         <p:nvSpPr>
-          <p:cNvPr id="4" name="Slide Number Placeholder 3"/>
+          <p:cNvPr id="4" name="Footer Placeholder 3"/>
           <p:cNvSpPr>
             <a:spLocks noGrp="1"/>
           </p:cNvSpPr>
           <p:nvPr>
-            <p:ph type="sldNum" sz="quarter" idx="5"/>
+            <p:ph type="ftr" sz="quarter" idx="10"/>
           </p:nvPr>
         </p:nvSpPr>
         <p:spPr/>
@@ -1036,18 +1034,68 @@
           <a:bodyPr/>
           <a:lstStyle/>
           <a:p>
-            <a:fld id="{2BF067CD-8E6B-4360-9AA8-C5DF2A48A6D1}" type="slidenum">
+            <a:r>
+              <a:rPr lang="en-US" sz="1000" dirty="0"/>
+              <a:t>© Software University Foundation – </a:t>
+            </a:r>
+            <a:r>
+              <a:rPr lang="en-US" sz="1000" u="sng" dirty="0">
+                <a:hlinkClick r:id="rId3"/>
+              </a:rPr>
+              <a:t>http://softuni.org</a:t>
+            </a:r>
+            <a:endParaRPr lang="en-US" sz="1000" dirty="0"/>
+          </a:p>
+          <a:p>
+            <a:r>
+              <a:rPr lang="en-US" sz="1000" dirty="0"/>
+              <a:t>This work is licensed under the </a:t>
+            </a:r>
+            <a:r>
+              <a:rPr lang="en-US" sz="1000" u="sng" noProof="1">
+                <a:hlinkClick r:id="rId4"/>
+              </a:rPr>
+              <a:t>Creative Commons Attribution-NonCommercial-ShareAlike</a:t>
+            </a:r>
+            <a:r>
+              <a:rPr lang="en-US" sz="1000" noProof="1"/>
+              <a:t> </a:t>
+            </a:r>
+            <a:r>
+              <a:rPr lang="en-US" sz="1000" dirty="0"/>
+              <a:t>license.</a:t>
+            </a:r>
+          </a:p>
+        </p:txBody>
+      </p:sp>
+      <p:sp>
+        <p:nvSpPr>
+          <p:cNvPr id="5" name="Slide Number Placeholder 4"/>
+          <p:cNvSpPr>
+            <a:spLocks noGrp="1"/>
+          </p:cNvSpPr>
+          <p:nvPr>
+            <p:ph type="sldNum" sz="quarter" idx="11"/>
+          </p:nvPr>
+        </p:nvSpPr>
+        <p:spPr/>
+        <p:txBody>
+          <a:bodyPr/>
+          <a:lstStyle/>
+          <a:p>
+            <a:fld id="{3EBA5BD7-F043-4D1B-AA17-CD412FC534DE}" type="slidenum">
               <a:rPr lang="en-US" smtClean="0"/>
+              <a:pPr/>
               <a:t>18</a:t>
             </a:fld>
-            <a:endParaRPr lang="en-US"/>
+            <a:endParaRPr lang="en-US" dirty="0"/>
           </a:p>
         </p:txBody>
       </p:sp>
     </p:spTree>
     <p:extLst>
       <p:ext uri="{BB962C8B-B14F-4D97-AF65-F5344CB8AC3E}">
-        <p14:creationId xmlns:p14="http://schemas.microsoft.com/office/powerpoint/2010/main" val="2690407238"/>
+        <p14:creationId xmlns:p14="http://schemas.microsoft.com/office/powerpoint/2010/main" val="2505804726"/>
       </p:ext>
     </p:extLst>
   </p:cSld>
@@ -1121,34 +1169,60 @@
           <a:lstStyle/>
           <a:p>
             <a:r>
-              <a:rPr lang="en-US" sz="1000" dirty="0"/>
+              <a:rPr lang="en-US" sz="1000" dirty="0">
+                <a:solidFill>
+                  <a:prstClr val="black"/>
+                </a:solidFill>
+              </a:rPr>
               <a:t>© Software University Foundation – </a:t>
             </a:r>
             <a:r>
               <a:rPr lang="en-US" sz="1000" u="sng" dirty="0">
+                <a:solidFill>
+                  <a:prstClr val="black"/>
+                </a:solidFill>
                 <a:hlinkClick r:id="rId3"/>
               </a:rPr>
               <a:t>http://softuni.org</a:t>
             </a:r>
-            <a:endParaRPr lang="en-US" sz="1000" dirty="0"/>
-          </a:p>
-          <a:p>
-            <a:r>
-              <a:rPr lang="en-US" sz="1000" dirty="0"/>
+            <a:endParaRPr lang="en-US" sz="1000" dirty="0">
+              <a:solidFill>
+                <a:prstClr val="black"/>
+              </a:solidFill>
+            </a:endParaRPr>
+          </a:p>
+          <a:p>
+            <a:r>
+              <a:rPr lang="en-US" sz="1000" dirty="0">
+                <a:solidFill>
+                  <a:prstClr val="black"/>
+                </a:solidFill>
+              </a:rPr>
               <a:t>This work is licensed under the </a:t>
             </a:r>
             <a:r>
               <a:rPr lang="en-US" sz="1000" u="sng" noProof="1">
+                <a:solidFill>
+                  <a:prstClr val="black"/>
+                </a:solidFill>
                 <a:hlinkClick r:id="rId4"/>
               </a:rPr>
               <a:t>Creative Commons Attribution-NonCommercial-ShareAlike</a:t>
             </a:r>
             <a:r>
-              <a:rPr lang="en-US" sz="1000" noProof="1"/>
+              <a:rPr lang="en-US" sz="1000" noProof="1">
+                <a:solidFill>
+                  <a:prstClr val="black"/>
+                </a:solidFill>
+              </a:rPr>
               <a:t> </a:t>
             </a:r>
             <a:r>
-              <a:rPr lang="en-US" sz="1000" dirty="0"/>
+              <a:rPr lang="en-US" sz="1000" dirty="0">
+                <a:solidFill>
+                  <a:prstClr val="black"/>
+                </a:solidFill>
+              </a:rPr>
               <a:t>license.</a:t>
             </a:r>
           </a:p>
@@ -1170,18 +1244,26 @@
           <a:lstStyle/>
           <a:p>
             <a:fld id="{3EBA5BD7-F043-4D1B-AA17-CD412FC534DE}" type="slidenum">
-              <a:rPr lang="en-US" smtClean="0"/>
+              <a:rPr lang="en-US" smtClean="0">
+                <a:solidFill>
+                  <a:prstClr val="black"/>
+                </a:solidFill>
+              </a:rPr>
               <a:pPr/>
               <a:t>19</a:t>
             </a:fld>
-            <a:endParaRPr lang="en-US" dirty="0"/>
+            <a:endParaRPr lang="en-US" dirty="0">
+              <a:solidFill>
+                <a:prstClr val="black"/>
+              </a:solidFill>
+            </a:endParaRPr>
           </a:p>
         </p:txBody>
       </p:sp>
     </p:spTree>
     <p:extLst>
       <p:ext uri="{BB962C8B-B14F-4D97-AF65-F5344CB8AC3E}">
-        <p14:creationId xmlns:p14="http://schemas.microsoft.com/office/powerpoint/2010/main" val="2505804726"/>
+        <p14:creationId xmlns:p14="http://schemas.microsoft.com/office/powerpoint/2010/main" val="2355064173"/>
       </p:ext>
     </p:extLst>
   </p:cSld>
@@ -1255,60 +1337,34 @@
           <a:lstStyle/>
           <a:p>
             <a:r>
-              <a:rPr lang="en-US" sz="1000" dirty="0">
-                <a:solidFill>
-                  <a:prstClr val="black"/>
-                </a:solidFill>
-              </a:rPr>
+              <a:rPr lang="en-US" sz="1000" dirty="0"/>
               <a:t>© Software University Foundation – </a:t>
             </a:r>
             <a:r>
               <a:rPr lang="en-US" sz="1000" u="sng" dirty="0">
-                <a:solidFill>
-                  <a:prstClr val="black"/>
-                </a:solidFill>
                 <a:hlinkClick r:id="rId3"/>
               </a:rPr>
               <a:t>http://softuni.org</a:t>
             </a:r>
-            <a:endParaRPr lang="en-US" sz="1000" dirty="0">
-              <a:solidFill>
-                <a:prstClr val="black"/>
-              </a:solidFill>
-            </a:endParaRPr>
-          </a:p>
-          <a:p>
-            <a:r>
-              <a:rPr lang="en-US" sz="1000" dirty="0">
-                <a:solidFill>
-                  <a:prstClr val="black"/>
-                </a:solidFill>
-              </a:rPr>
+            <a:endParaRPr lang="en-US" sz="1000" dirty="0"/>
+          </a:p>
+          <a:p>
+            <a:r>
+              <a:rPr lang="en-US" sz="1000" dirty="0"/>
               <a:t>This work is licensed under the </a:t>
             </a:r>
             <a:r>
               <a:rPr lang="en-US" sz="1000" u="sng" noProof="1">
-                <a:solidFill>
-                  <a:prstClr val="black"/>
-                </a:solidFill>
                 <a:hlinkClick r:id="rId4"/>
               </a:rPr>
               <a:t>Creative Commons Attribution-NonCommercial-ShareAlike</a:t>
             </a:r>
             <a:r>
-              <a:rPr lang="en-US" sz="1000" noProof="1">
-                <a:solidFill>
-                  <a:prstClr val="black"/>
-                </a:solidFill>
-              </a:rPr>
+              <a:rPr lang="en-US" sz="1000" noProof="1"/>
               <a:t> </a:t>
             </a:r>
             <a:r>
-              <a:rPr lang="en-US" sz="1000" dirty="0">
-                <a:solidFill>
-                  <a:prstClr val="black"/>
-                </a:solidFill>
-              </a:rPr>
+              <a:rPr lang="en-US" sz="1000" dirty="0"/>
               <a:t>license.</a:t>
             </a:r>
           </a:p>
@@ -1330,151 +1386,9 @@
           <a:lstStyle/>
           <a:p>
             <a:fld id="{3EBA5BD7-F043-4D1B-AA17-CD412FC534DE}" type="slidenum">
-              <a:rPr lang="en-US" smtClean="0">
-                <a:solidFill>
-                  <a:prstClr val="black"/>
-                </a:solidFill>
-              </a:rPr>
+              <a:rPr lang="en-US" smtClean="0"/>
               <a:pPr/>
               <a:t>20</a:t>
-            </a:fld>
-            <a:endParaRPr lang="en-US" dirty="0">
-              <a:solidFill>
-                <a:prstClr val="black"/>
-              </a:solidFill>
-            </a:endParaRPr>
-          </a:p>
-        </p:txBody>
-      </p:sp>
-    </p:spTree>
-    <p:extLst>
-      <p:ext uri="{BB962C8B-B14F-4D97-AF65-F5344CB8AC3E}">
-        <p14:creationId xmlns:p14="http://schemas.microsoft.com/office/powerpoint/2010/main" val="2355064173"/>
-      </p:ext>
-    </p:extLst>
-  </p:cSld>
-  <p:clrMapOvr>
-    <a:masterClrMapping/>
-  </p:clrMapOvr>
-</p:notes>
-</file>
-
-<file path=ppt/notesSlides/notesSlide14.xml><?xml version="1.0" encoding="utf-8"?>
-<p:notes xmlns:a="http://schemas.openxmlformats.org/drawingml/2006/main" xmlns:r="http://schemas.openxmlformats.org/officeDocument/2006/relationships" xmlns:p="http://schemas.openxmlformats.org/presentationml/2006/main">
-  <p:cSld>
-    <p:spTree>
-      <p:nvGrpSpPr>
-        <p:cNvPr id="1" name=""/>
-        <p:cNvGrpSpPr/>
-        <p:nvPr/>
-      </p:nvGrpSpPr>
-      <p:grpSpPr>
-        <a:xfrm>
-          <a:off x="0" y="0"/>
-          <a:ext cx="0" cy="0"/>
-          <a:chOff x="0" y="0"/>
-          <a:chExt cx="0" cy="0"/>
-        </a:xfrm>
-      </p:grpSpPr>
-      <p:sp>
-        <p:nvSpPr>
-          <p:cNvPr id="2" name="Slide Image Placeholder 1"/>
-          <p:cNvSpPr>
-            <a:spLocks noGrp="1" noRot="1" noChangeAspect="1"/>
-          </p:cNvSpPr>
-          <p:nvPr>
-            <p:ph type="sldImg"/>
-          </p:nvPr>
-        </p:nvSpPr>
-        <p:spPr/>
-      </p:sp>
-      <p:sp>
-        <p:nvSpPr>
-          <p:cNvPr id="3" name="Notes Placeholder 2"/>
-          <p:cNvSpPr>
-            <a:spLocks noGrp="1"/>
-          </p:cNvSpPr>
-          <p:nvPr>
-            <p:ph type="body" idx="1"/>
-          </p:nvPr>
-        </p:nvSpPr>
-        <p:spPr/>
-        <p:txBody>
-          <a:bodyPr/>
-          <a:lstStyle/>
-          <a:p>
-            <a:endParaRPr lang="en-US" dirty="0"/>
-          </a:p>
-        </p:txBody>
-      </p:sp>
-      <p:sp>
-        <p:nvSpPr>
-          <p:cNvPr id="4" name="Footer Placeholder 3"/>
-          <p:cNvSpPr>
-            <a:spLocks noGrp="1"/>
-          </p:cNvSpPr>
-          <p:nvPr>
-            <p:ph type="ftr" sz="quarter" idx="10"/>
-          </p:nvPr>
-        </p:nvSpPr>
-        <p:spPr/>
-        <p:txBody>
-          <a:bodyPr/>
-          <a:lstStyle/>
-          <a:p>
-            <a:r>
-              <a:rPr lang="en-US" sz="1000" dirty="0"/>
-              <a:t>© Software University Foundation – </a:t>
-            </a:r>
-            <a:r>
-              <a:rPr lang="en-US" sz="1000" u="sng" dirty="0">
-                <a:hlinkClick r:id="rId3"/>
-              </a:rPr>
-              <a:t>http://softuni.org</a:t>
-            </a:r>
-            <a:endParaRPr lang="en-US" sz="1000" dirty="0"/>
-          </a:p>
-          <a:p>
-            <a:r>
-              <a:rPr lang="en-US" sz="1000" dirty="0"/>
-              <a:t>This work is licensed under the </a:t>
-            </a:r>
-            <a:r>
-              <a:rPr lang="en-US" sz="1000" u="sng" noProof="1">
-                <a:hlinkClick r:id="rId4"/>
-              </a:rPr>
-              <a:t>Creative Commons Attribution-NonCommercial-ShareAlike</a:t>
-            </a:r>
-            <a:r>
-              <a:rPr lang="en-US" sz="1000" noProof="1"/>
-              <a:t> </a:t>
-            </a:r>
-            <a:r>
-              <a:rPr lang="en-US" sz="1000" dirty="0"/>
-              <a:t>license.</a:t>
-            </a:r>
-          </a:p>
-        </p:txBody>
-      </p:sp>
-      <p:sp>
-        <p:nvSpPr>
-          <p:cNvPr id="5" name="Slide Number Placeholder 4"/>
-          <p:cNvSpPr>
-            <a:spLocks noGrp="1"/>
-          </p:cNvSpPr>
-          <p:nvPr>
-            <p:ph type="sldNum" sz="quarter" idx="11"/>
-          </p:nvPr>
-        </p:nvSpPr>
-        <p:spPr/>
-        <p:txBody>
-          <a:bodyPr/>
-          <a:lstStyle/>
-          <a:p>
-            <a:fld id="{3EBA5BD7-F043-4D1B-AA17-CD412FC534DE}" type="slidenum">
-              <a:rPr lang="en-US" smtClean="0"/>
-              <a:pPr/>
-              <a:t>21</a:t>
             </a:fld>
             <a:endParaRPr lang="en-US" dirty="0"/>
           </a:p>
@@ -3345,7 +3259,7 @@
             <a:fld id="{055373AC-9AA7-423B-BA00-BA1C74164DBD}" type="datetime1">
               <a:rPr lang="en-US" smtClean="0"/>
               <a:pPr/>
-              <a:t>7/26/23</a:t>
+              <a:t>7/27/2023</a:t>
             </a:fld>
             <a:endParaRPr lang="en-US" dirty="0"/>
           </a:p>
@@ -4024,7 +3938,7 @@
             <a:fld id="{055373AC-9AA7-423B-BA00-BA1C74164DBD}" type="datetime1">
               <a:rPr lang="en-US" smtClean="0"/>
               <a:pPr/>
-              <a:t>7/26/23</a:t>
+              <a:t>7/27/2023</a:t>
             </a:fld>
             <a:endParaRPr lang="en-US" dirty="0"/>
           </a:p>
@@ -4783,7 +4697,7 @@
             <a:fld id="{055373AC-9AA7-423B-BA00-BA1C74164DBD}" type="datetime1">
               <a:rPr lang="en-US" smtClean="0"/>
               <a:pPr/>
-              <a:t>7/26/23</a:t>
+              <a:t>7/27/2023</a:t>
             </a:fld>
             <a:endParaRPr lang="en-US" dirty="0"/>
           </a:p>
@@ -5278,7 +5192,7 @@
             <a:fld id="{055373AC-9AA7-423B-BA00-BA1C74164DBD}" type="datetime1">
               <a:rPr lang="en-US" smtClean="0"/>
               <a:pPr/>
-              <a:t>7/26/23</a:t>
+              <a:t>7/27/2023</a:t>
             </a:fld>
             <a:endParaRPr lang="en-US" dirty="0"/>
           </a:p>
@@ -7388,7 +7302,7 @@
             <a:fld id="{055373AC-9AA7-423B-BA00-BA1C74164DBD}" type="datetime1">
               <a:rPr lang="en-US" smtClean="0"/>
               <a:pPr/>
-              <a:t>7/26/23</a:t>
+              <a:t>7/27/2023</a:t>
             </a:fld>
             <a:endParaRPr lang="en-US" dirty="0"/>
           </a:p>
@@ -8727,7 +8641,7 @@
             <a:fld id="{055373AC-9AA7-423B-BA00-BA1C74164DBD}" type="datetime1">
               <a:rPr lang="en-US" smtClean="0"/>
               <a:pPr/>
-              <a:t>7/26/23</a:t>
+              <a:t>7/27/2023</a:t>
             </a:fld>
             <a:endParaRPr lang="en-US" dirty="0"/>
           </a:p>
@@ -9807,7 +9721,7 @@
             <a:fld id="{055373AC-9AA7-423B-BA00-BA1C74164DBD}" type="datetime1">
               <a:rPr lang="en-US" smtClean="0"/>
               <a:pPr/>
-              <a:t>7/26/23</a:t>
+              <a:t>7/27/2023</a:t>
             </a:fld>
             <a:endParaRPr lang="en-US" dirty="0"/>
           </a:p>
@@ -10219,7 +10133,7 @@
             <a:fld id="{055373AC-9AA7-423B-BA00-BA1C74164DBD}" type="datetime1">
               <a:rPr lang="en-US" smtClean="0"/>
               <a:pPr/>
-              <a:t>7/26/23</a:t>
+              <a:t>7/27/2023</a:t>
             </a:fld>
             <a:endParaRPr lang="en-US" dirty="0"/>
           </a:p>
@@ -10589,7 +10503,7 @@
             <a:fld id="{055373AC-9AA7-423B-BA00-BA1C74164DBD}" type="datetime1">
               <a:rPr lang="en-US" smtClean="0"/>
               <a:pPr/>
-              <a:t>7/26/23</a:t>
+              <a:t>7/27/2023</a:t>
             </a:fld>
             <a:endParaRPr lang="en-US" dirty="0"/>
           </a:p>
@@ -11257,7 +11171,7 @@
             <a:fld id="{055373AC-9AA7-423B-BA00-BA1C74164DBD}" type="datetime1">
               <a:rPr lang="en-US" smtClean="0"/>
               <a:pPr/>
-              <a:t>7/26/23</a:t>
+              <a:t>7/27/2023</a:t>
             </a:fld>
             <a:endParaRPr lang="en-US" dirty="0"/>
           </a:p>
@@ -11465,7 +11379,7 @@
             <a:fld id="{055373AC-9AA7-423B-BA00-BA1C74164DBD}" type="datetime1">
               <a:rPr lang="en-US" smtClean="0"/>
               <a:pPr/>
-              <a:t>7/26/23</a:t>
+              <a:t>7/27/2023</a:t>
             </a:fld>
             <a:endParaRPr lang="en-US" dirty="0"/>
           </a:p>
@@ -12271,6 +12185,13 @@
       <p:transition spd="slow" advClick="0" advTm="5000"/>
     </mc:Fallback>
   </mc:AlternateContent>
+  <p:timing>
+    <p:tnLst>
+      <p:par>
+        <p:cTn id="1" dur="indefinite" restart="never" nodeType="tmRoot"/>
+      </p:par>
+    </p:tnLst>
+  </p:timing>
 </p:sld>
 </file>
 
@@ -12336,7 +12257,12 @@
             <p:ph type="body" sz="quarter" idx="10"/>
           </p:nvPr>
         </p:nvSpPr>
-        <p:spPr/>
+        <p:spPr>
+          <a:xfrm>
+            <a:off x="1959071" y="1146585"/>
+            <a:ext cx="10036163" cy="3973370"/>
+          </a:xfrm>
+        </p:spPr>
         <p:txBody>
           <a:bodyPr>
             <a:normAutofit/>
@@ -12405,7 +12331,11 @@
             </a:r>
             <a:r>
               <a:rPr lang="bg-BG" sz="3400" dirty="0"/>
-              <a:t> име</a:t>
+              <a:t> </a:t>
+            </a:r>
+            <a:r>
+              <a:rPr lang="bg-BG" sz="3400" dirty="0" smtClean="0"/>
+              <a:t>име</a:t>
             </a:r>
           </a:p>
         </p:txBody>
@@ -12437,80 +12367,6 @@
               <a:t>10</a:t>
             </a:fld>
             <a:endParaRPr lang="en-US" dirty="0"/>
-          </a:p>
-        </p:txBody>
-      </p:sp>
-      <p:sp>
-        <p:nvSpPr>
-          <p:cNvPr id="2" name="TextBox 1">
-            <a:extLst>
-              <a:ext uri="{FF2B5EF4-FFF2-40B4-BE49-F238E27FC236}">
-                <a16:creationId xmlns:a16="http://schemas.microsoft.com/office/drawing/2014/main" id="{7FB309E2-844D-91D7-9CB9-352B0B535C68}"/>
-              </a:ext>
-            </a:extLst>
-          </p:cNvPr>
-          <p:cNvSpPr txBox="1"/>
-          <p:nvPr/>
-        </p:nvSpPr>
-        <p:spPr>
-          <a:xfrm>
-            <a:off x="5893443" y="4560709"/>
-            <a:ext cx="5521124" cy="1538471"/>
-          </a:xfrm>
-          <a:prstGeom prst="rect">
-            <a:avLst/>
-          </a:prstGeom>
-          <a:ln/>
-        </p:spPr>
-        <p:style>
-          <a:lnRef idx="2">
-            <a:schemeClr val="accent2"/>
-          </a:lnRef>
-          <a:fillRef idx="1">
-            <a:schemeClr val="lt1"/>
-          </a:fillRef>
-          <a:effectRef idx="0">
-            <a:schemeClr val="accent2"/>
-          </a:effectRef>
-          <a:fontRef idx="minor">
-            <a:schemeClr val="dk1"/>
-          </a:fontRef>
-        </p:style>
-        <p:txBody>
-          <a:bodyPr vert="horz" wrap="square" lIns="144000" tIns="108000" rIns="144000" bIns="108000" rtlCol="0">
-            <a:spAutoFit/>
-          </a:bodyPr>
-          <a:lstStyle/>
-          <a:p>
-            <a:pPr algn="l" eaLnBrk="0" hangingPunct="0">
-              <a:lnSpc>
-                <a:spcPct val="110000"/>
-              </a:lnSpc>
-              <a:buClr>
-                <a:schemeClr val="accent5">
-                  <a:lumMod val="40000"/>
-                  <a:lumOff val="60000"/>
-                </a:schemeClr>
-              </a:buClr>
-              <a:buSzPct val="70000"/>
-            </a:pPr>
-            <a:r>
-              <a:rPr lang="en-BG" sz="4000" dirty="0"/>
-              <a:t>TODO:</a:t>
-            </a:r>
-            <a:r>
-              <a:rPr lang="bg-BG" sz="4000" dirty="0"/>
-              <a:t> Да се добави още един </a:t>
-            </a:r>
-            <a:r>
-              <a:rPr lang="bg-BG" sz="4000" dirty="0" err="1"/>
-              <a:t>булет</a:t>
-            </a:r>
-            <a:r>
-              <a:rPr lang="bg-BG" sz="4000" dirty="0"/>
-              <a:t>?</a:t>
-            </a:r>
-            <a:endParaRPr lang="en-BG" sz="4000" dirty="0"/>
           </a:p>
         </p:txBody>
       </p:sp>
@@ -12721,7 +12577,12 @@
             <p:ph type="body" sz="quarter" idx="10"/>
           </p:nvPr>
         </p:nvSpPr>
-        <p:spPr/>
+        <p:spPr>
+          <a:xfrm>
+            <a:off x="190405" y="1505614"/>
+            <a:ext cx="11376010" cy="4360613"/>
+          </a:xfrm>
+        </p:spPr>
         <p:txBody>
           <a:bodyPr>
             <a:normAutofit/>
@@ -12913,11 +12774,11 @@
   <p:clrMapOvr>
     <a:masterClrMapping/>
   </p:clrMapOvr>
-  <mc:AlternateContent xmlns:mc="http://schemas.openxmlformats.org/markup-compatibility/2006">
-    <mc:Choice xmlns:p14="http://schemas.microsoft.com/office/powerpoint/2010/main" Requires="p14">
+  <mc:AlternateContent xmlns:mc="http://schemas.openxmlformats.org/markup-compatibility/2006" xmlns:p14="http://schemas.microsoft.com/office/powerpoint/2010/main">
+    <mc:Choice Requires="p14">
       <p:transition spd="slow" p14:dur="2000" advClick="0" advTm="5000"/>
     </mc:Choice>
-    <mc:Fallback>
+    <mc:Fallback xmlns="">
       <p:transition spd="slow" advClick="0" advTm="5000"/>
     </mc:Fallback>
   </mc:AlternateContent>
@@ -13079,7 +12940,12 @@
             <p:ph type="body" sz="quarter" idx="10"/>
           </p:nvPr>
         </p:nvSpPr>
-        <p:spPr/>
+        <p:spPr>
+          <a:xfrm>
+            <a:off x="190405" y="1504975"/>
+            <a:ext cx="11818096" cy="5201066"/>
+          </a:xfrm>
+        </p:spPr>
         <p:txBody>
           <a:bodyPr>
             <a:normAutofit/>
@@ -13260,6 +13126,13 @@
       <p:transition spd="slow" advClick="0" advTm="5000"/>
     </mc:Fallback>
   </mc:AlternateContent>
+  <p:timing>
+    <p:tnLst>
+      <p:par>
+        <p:cTn id="1" dur="indefinite" restart="never" nodeType="tmRoot"/>
+      </p:par>
+    </p:tnLst>
+  </p:timing>
 </p:sld>
 </file>
 
@@ -13290,7 +13163,12 @@
             <p:ph type="body" sz="quarter" idx="10"/>
           </p:nvPr>
         </p:nvSpPr>
-        <p:spPr/>
+        <p:spPr>
+          <a:xfrm>
+            <a:off x="373904" y="1504975"/>
+            <a:ext cx="11818096" cy="5201066"/>
+          </a:xfrm>
+        </p:spPr>
         <p:txBody>
           <a:bodyPr>
             <a:normAutofit/>
@@ -13299,8 +13177,23 @@
           <a:p>
             <a:r>
               <a:rPr lang="bg-BG" dirty="0"/>
-              <a:t>Задава се от ОС </a:t>
-            </a:r>
+              <a:t>Задава се от </a:t>
+            </a:r>
+            <a:r>
+              <a:rPr lang="bg-BG" dirty="0" smtClean="0"/>
+              <a:t>ОС</a:t>
+            </a:r>
+          </a:p>
+          <a:p>
+            <a:r>
+              <a:rPr lang="bg-BG" dirty="0" smtClean="0"/>
+              <a:t>Един физически НИ може да е разделен на няколко логически дяла, като всеки дял си има логическо име</a:t>
+            </a:r>
+            <a:r>
+              <a:rPr lang="bg-BG" dirty="0" smtClean="0"/>
+              <a:t> </a:t>
+            </a:r>
+            <a:endParaRPr lang="bg-BG" dirty="0"/>
           </a:p>
           <a:p>
             <a:r>
@@ -13309,11 +13202,20 @@
             </a:r>
           </a:p>
           <a:p>
-            <a:pPr lvl="1"/>
             <a:r>
               <a:rPr lang="bg-BG" dirty="0"/>
-              <a:t>Не зависи от вида на устройството</a:t>
-            </a:r>
+              <a:t>Не зависи от вида на </a:t>
+            </a:r>
+            <a:r>
+              <a:rPr lang="bg-BG" dirty="0" smtClean="0"/>
+              <a:t>устройството</a:t>
+            </a:r>
+          </a:p>
+          <a:p>
+            <a:pPr marL="609219" lvl="1" indent="0">
+              <a:buNone/>
+            </a:pPr>
+            <a:endParaRPr lang="bg-BG" dirty="0"/>
           </a:p>
         </p:txBody>
       </p:sp>
@@ -13377,76 +13279,6 @@
           </a:p>
         </p:txBody>
       </p:sp>
-      <p:sp>
-        <p:nvSpPr>
-          <p:cNvPr id="2" name="TextBox 1">
-            <a:extLst>
-              <a:ext uri="{FF2B5EF4-FFF2-40B4-BE49-F238E27FC236}">
-                <a16:creationId xmlns:a16="http://schemas.microsoft.com/office/drawing/2014/main" id="{8777F42A-293F-DC3D-69E4-C412C6703E55}"/>
-              </a:ext>
-            </a:extLst>
-          </p:cNvPr>
-          <p:cNvSpPr txBox="1"/>
-          <p:nvPr/>
-        </p:nvSpPr>
-        <p:spPr>
-          <a:xfrm>
-            <a:off x="5893443" y="4560709"/>
-            <a:ext cx="5521124" cy="1538471"/>
-          </a:xfrm>
-          <a:prstGeom prst="rect">
-            <a:avLst/>
-          </a:prstGeom>
-          <a:ln/>
-        </p:spPr>
-        <p:style>
-          <a:lnRef idx="2">
-            <a:schemeClr val="accent2"/>
-          </a:lnRef>
-          <a:fillRef idx="1">
-            <a:schemeClr val="lt1"/>
-          </a:fillRef>
-          <a:effectRef idx="0">
-            <a:schemeClr val="accent2"/>
-          </a:effectRef>
-          <a:fontRef idx="minor">
-            <a:schemeClr val="dk1"/>
-          </a:fontRef>
-        </p:style>
-        <p:txBody>
-          <a:bodyPr vert="horz" wrap="square" lIns="144000" tIns="108000" rIns="144000" bIns="108000" rtlCol="0">
-            <a:spAutoFit/>
-          </a:bodyPr>
-          <a:lstStyle/>
-          <a:p>
-            <a:pPr algn="l" eaLnBrk="0" hangingPunct="0">
-              <a:lnSpc>
-                <a:spcPct val="110000"/>
-              </a:lnSpc>
-              <a:buClr>
-                <a:schemeClr val="accent5">
-                  <a:lumMod val="40000"/>
-                  <a:lumOff val="60000"/>
-                </a:schemeClr>
-              </a:buClr>
-              <a:buSzPct val="70000"/>
-            </a:pPr>
-            <a:r>
-              <a:rPr lang="en-BG" sz="4000" dirty="0"/>
-              <a:t>TODO:</a:t>
-            </a:r>
-            <a:r>
-              <a:rPr lang="bg-BG" sz="4000" dirty="0"/>
-              <a:t> Да се добавят още 1-2 </a:t>
-            </a:r>
-            <a:r>
-              <a:rPr lang="bg-BG" sz="4000" dirty="0" err="1"/>
-              <a:t>булета</a:t>
-            </a:r>
-            <a:endParaRPr lang="en-BG" sz="4000" dirty="0"/>
-          </a:p>
-        </p:txBody>
-      </p:sp>
     </p:spTree>
     <p:extLst>
       <p:ext uri="{BB962C8B-B14F-4D97-AF65-F5344CB8AC3E}">
@@ -13457,11 +13289,11 @@
   <p:clrMapOvr>
     <a:masterClrMapping/>
   </p:clrMapOvr>
-  <mc:AlternateContent xmlns:mc="http://schemas.openxmlformats.org/markup-compatibility/2006">
-    <mc:Choice xmlns:p14="http://schemas.microsoft.com/office/powerpoint/2010/main" Requires="p14">
+  <mc:AlternateContent xmlns:mc="http://schemas.openxmlformats.org/markup-compatibility/2006" xmlns:p14="http://schemas.microsoft.com/office/powerpoint/2010/main">
+    <mc:Choice Requires="p14">
       <p:transition spd="slow" p14:dur="2000" advClick="0" advTm="5000"/>
     </mc:Choice>
-    <mc:Fallback>
+    <mc:Fallback xmlns="">
       <p:transition spd="slow" advClick="0" advTm="5000"/>
     </mc:Fallback>
   </mc:AlternateContent>
@@ -13486,7 +13318,7 @@
                             </p:stCondLst>
                             <p:childTnLst>
                               <p:par>
-                                <p:cTn id="5" presetID="1" presetClass="entr" presetSubtype="0" fill="hold" nodeType="clickEffect">
+                                <p:cTn id="5" presetID="1" presetClass="entr" presetSubtype="0" fill="hold" grpId="0" nodeType="clickEffect">
                                   <p:stCondLst>
                                     <p:cond delay="0"/>
                                   </p:stCondLst>
@@ -13494,6 +13326,55 @@
                                     <p:set>
                                       <p:cBhvr>
                                         <p:cTn id="6" dur="1" fill="hold">
+                                          <p:stCondLst>
+                                            <p:cond delay="0"/>
+                                          </p:stCondLst>
+                                        </p:cTn>
+                                        <p:tgtEl>
+                                          <p:spTgt spid="3">
+                                            <p:txEl>
+                                              <p:pRg st="0" end="0"/>
+                                            </p:txEl>
+                                          </p:spTgt>
+                                        </p:tgtEl>
+                                        <p:attrNameLst>
+                                          <p:attrName>style.visibility</p:attrName>
+                                        </p:attrNameLst>
+                                      </p:cBhvr>
+                                      <p:to>
+                                        <p:strVal val="visible"/>
+                                      </p:to>
+                                    </p:set>
+                                  </p:childTnLst>
+                                </p:cTn>
+                              </p:par>
+                            </p:childTnLst>
+                          </p:cTn>
+                        </p:par>
+                      </p:childTnLst>
+                    </p:cTn>
+                  </p:par>
+                  <p:par>
+                    <p:cTn id="7" fill="hold">
+                      <p:stCondLst>
+                        <p:cond delay="indefinite"/>
+                      </p:stCondLst>
+                      <p:childTnLst>
+                        <p:par>
+                          <p:cTn id="8" fill="hold">
+                            <p:stCondLst>
+                              <p:cond delay="0"/>
+                            </p:stCondLst>
+                            <p:childTnLst>
+                              <p:par>
+                                <p:cTn id="9" presetID="1" presetClass="entr" presetSubtype="0" fill="hold" grpId="0" nodeType="clickEffect">
+                                  <p:stCondLst>
+                                    <p:cond delay="0"/>
+                                  </p:stCondLst>
+                                  <p:childTnLst>
+                                    <p:set>
+                                      <p:cBhvr>
+                                        <p:cTn id="10" dur="1" fill="hold">
                                           <p:stCondLst>
                                             <p:cond delay="0"/>
                                           </p:stCondLst>
@@ -13516,15 +13397,33 @@
                                   </p:childTnLst>
                                 </p:cTn>
                               </p:par>
+                            </p:childTnLst>
+                          </p:cTn>
+                        </p:par>
+                      </p:childTnLst>
+                    </p:cTn>
+                  </p:par>
+                  <p:par>
+                    <p:cTn id="11" fill="hold">
+                      <p:stCondLst>
+                        <p:cond delay="indefinite"/>
+                      </p:stCondLst>
+                      <p:childTnLst>
+                        <p:par>
+                          <p:cTn id="12" fill="hold">
+                            <p:stCondLst>
+                              <p:cond delay="0"/>
+                            </p:stCondLst>
+                            <p:childTnLst>
                               <p:par>
-                                <p:cTn id="7" presetID="1" presetClass="entr" presetSubtype="0" fill="hold" nodeType="withEffect">
+                                <p:cTn id="13" presetID="1" presetClass="entr" presetSubtype="0" fill="hold" grpId="0" nodeType="clickEffect">
                                   <p:stCondLst>
                                     <p:cond delay="0"/>
                                   </p:stCondLst>
                                   <p:childTnLst>
                                     <p:set>
                                       <p:cBhvr>
-                                        <p:cTn id="8" dur="1" fill="hold">
+                                        <p:cTn id="14" dur="1" fill="hold">
                                           <p:stCondLst>
                                             <p:cond delay="0"/>
                                           </p:stCondLst>
@@ -13533,6 +13432,55 @@
                                           <p:spTgt spid="3">
                                             <p:txEl>
                                               <p:pRg st="2" end="2"/>
+                                            </p:txEl>
+                                          </p:spTgt>
+                                        </p:tgtEl>
+                                        <p:attrNameLst>
+                                          <p:attrName>style.visibility</p:attrName>
+                                        </p:attrNameLst>
+                                      </p:cBhvr>
+                                      <p:to>
+                                        <p:strVal val="visible"/>
+                                      </p:to>
+                                    </p:set>
+                                  </p:childTnLst>
+                                </p:cTn>
+                              </p:par>
+                            </p:childTnLst>
+                          </p:cTn>
+                        </p:par>
+                      </p:childTnLst>
+                    </p:cTn>
+                  </p:par>
+                  <p:par>
+                    <p:cTn id="15" fill="hold">
+                      <p:stCondLst>
+                        <p:cond delay="indefinite"/>
+                      </p:stCondLst>
+                      <p:childTnLst>
+                        <p:par>
+                          <p:cTn id="16" fill="hold">
+                            <p:stCondLst>
+                              <p:cond delay="0"/>
+                            </p:stCondLst>
+                            <p:childTnLst>
+                              <p:par>
+                                <p:cTn id="17" presetID="1" presetClass="entr" presetSubtype="0" fill="hold" grpId="0" nodeType="clickEffect">
+                                  <p:stCondLst>
+                                    <p:cond delay="0"/>
+                                  </p:stCondLst>
+                                  <p:childTnLst>
+                                    <p:set>
+                                      <p:cBhvr>
+                                        <p:cTn id="18" dur="1" fill="hold">
+                                          <p:stCondLst>
+                                            <p:cond delay="0"/>
+                                          </p:stCondLst>
+                                        </p:cTn>
+                                        <p:tgtEl>
+                                          <p:spTgt spid="3">
+                                            <p:txEl>
+                                              <p:pRg st="3" end="3"/>
                                             </p:txEl>
                                           </p:spTgt>
                                         </p:tgtEl>
@@ -13574,6 +13522,9 @@
         </p:cTn>
       </p:par>
     </p:tnLst>
+    <p:bldLst>
+      <p:bldP spid="3" grpId="0" uiExpand="1" build="p"/>
+    </p:bldLst>
   </p:timing>
 </p:sld>
 </file>
@@ -14063,7 +14014,7 @@
                 <a:alpha val="80000"/>
               </a:schemeClr>
             </a:solidFill>
-            <a:prstDash val="sysDash"/>
+            <a:prstDash val="solid"/>
           </a:ln>
           <a:effectLst/>
         </p:spPr>
@@ -14105,72 +14056,6 @@
                 </a:outerShdw>
               </a:effectLst>
             </a:endParaRPr>
-          </a:p>
-        </p:txBody>
-      </p:sp>
-      <p:sp>
-        <p:nvSpPr>
-          <p:cNvPr id="8" name="TextBox 7">
-            <a:extLst>
-              <a:ext uri="{FF2B5EF4-FFF2-40B4-BE49-F238E27FC236}">
-                <a16:creationId xmlns:a16="http://schemas.microsoft.com/office/drawing/2014/main" id="{989021FB-5E5B-F6E0-E246-7D8D547375AF}"/>
-              </a:ext>
-            </a:extLst>
-          </p:cNvPr>
-          <p:cNvSpPr txBox="1"/>
-          <p:nvPr/>
-        </p:nvSpPr>
-        <p:spPr>
-          <a:xfrm>
-            <a:off x="7378260" y="1372312"/>
-            <a:ext cx="4616974" cy="2215579"/>
-          </a:xfrm>
-          <a:prstGeom prst="rect">
-            <a:avLst/>
-          </a:prstGeom>
-          <a:ln/>
-        </p:spPr>
-        <p:style>
-          <a:lnRef idx="2">
-            <a:schemeClr val="accent2"/>
-          </a:lnRef>
-          <a:fillRef idx="1">
-            <a:schemeClr val="lt1"/>
-          </a:fillRef>
-          <a:effectRef idx="0">
-            <a:schemeClr val="accent2"/>
-          </a:effectRef>
-          <a:fontRef idx="minor">
-            <a:schemeClr val="dk1"/>
-          </a:fontRef>
-        </p:style>
-        <p:txBody>
-          <a:bodyPr vert="horz" wrap="square" lIns="144000" tIns="108000" rIns="144000" bIns="108000" rtlCol="0">
-            <a:spAutoFit/>
-          </a:bodyPr>
-          <a:lstStyle/>
-          <a:p>
-            <a:pPr algn="l" eaLnBrk="0" hangingPunct="0">
-              <a:lnSpc>
-                <a:spcPct val="110000"/>
-              </a:lnSpc>
-              <a:buClr>
-                <a:schemeClr val="accent5">
-                  <a:lumMod val="40000"/>
-                  <a:lumOff val="60000"/>
-                </a:schemeClr>
-              </a:buClr>
-              <a:buSzPct val="70000"/>
-            </a:pPr>
-            <a:r>
-              <a:rPr lang="en-BG" sz="4000" dirty="0"/>
-              <a:t>TODO:</a:t>
-            </a:r>
-            <a:r>
-              <a:rPr lang="bg-BG" sz="4000" dirty="0"/>
-              <a:t> Да се направи плътна линия</a:t>
-            </a:r>
-            <a:endParaRPr lang="en-BG" sz="4000" dirty="0"/>
           </a:p>
         </p:txBody>
       </p:sp>
@@ -14303,7 +14188,7 @@
                             </p:stCondLst>
                             <p:childTnLst>
                               <p:par>
-                                <p:cTn id="13" presetID="1" presetClass="entr" presetSubtype="0" fill="hold" grpId="0" nodeType="clickEffect">
+                                <p:cTn id="13" presetID="1" presetClass="entr" presetSubtype="0" fill="hold" nodeType="clickEffect">
                                   <p:stCondLst>
                                     <p:cond delay="0"/>
                                   </p:stCondLst>
@@ -14316,7 +14201,79 @@
                                           </p:stCondLst>
                                         </p:cTn>
                                         <p:tgtEl>
+                                          <p:spTgt spid="7"/>
+                                        </p:tgtEl>
+                                        <p:attrNameLst>
+                                          <p:attrName>style.visibility</p:attrName>
+                                        </p:attrNameLst>
+                                      </p:cBhvr>
+                                      <p:to>
+                                        <p:strVal val="visible"/>
+                                      </p:to>
+                                    </p:set>
+                                  </p:childTnLst>
+                                </p:cTn>
+                              </p:par>
+                            </p:childTnLst>
+                          </p:cTn>
+                        </p:par>
+                      </p:childTnLst>
+                    </p:cTn>
+                  </p:par>
+                  <p:par>
+                    <p:cTn id="15" fill="hold">
+                      <p:stCondLst>
+                        <p:cond delay="indefinite"/>
+                      </p:stCondLst>
+                      <p:childTnLst>
+                        <p:par>
+                          <p:cTn id="16" fill="hold">
+                            <p:stCondLst>
+                              <p:cond delay="0"/>
+                            </p:stCondLst>
+                            <p:childTnLst>
+                              <p:par>
+                                <p:cTn id="17" presetID="1" presetClass="entr" presetSubtype="0" fill="hold" grpId="0" nodeType="clickEffect">
+                                  <p:stCondLst>
+                                    <p:cond delay="0"/>
+                                  </p:stCondLst>
+                                  <p:childTnLst>
+                                    <p:set>
+                                      <p:cBhvr>
+                                        <p:cTn id="18" dur="1" fill="hold">
+                                          <p:stCondLst>
+                                            <p:cond delay="0"/>
+                                          </p:stCondLst>
+                                        </p:cTn>
+                                        <p:tgtEl>
                                           <p:spTgt spid="13"/>
+                                        </p:tgtEl>
+                                        <p:attrNameLst>
+                                          <p:attrName>style.visibility</p:attrName>
+                                        </p:attrNameLst>
+                                      </p:cBhvr>
+                                      <p:to>
+                                        <p:strVal val="visible"/>
+                                      </p:to>
+                                    </p:set>
+                                  </p:childTnLst>
+                                </p:cTn>
+                              </p:par>
+                              <p:par>
+                                <p:cTn id="19" presetID="1" presetClass="entr" presetSubtype="0" fill="hold" grpId="0" nodeType="withEffect">
+                                  <p:stCondLst>
+                                    <p:cond delay="0"/>
+                                  </p:stCondLst>
+                                  <p:childTnLst>
+                                    <p:set>
+                                      <p:cBhvr>
+                                        <p:cTn id="20" dur="1" fill="hold">
+                                          <p:stCondLst>
+                                            <p:cond delay="0"/>
+                                          </p:stCondLst>
+                                        </p:cTn>
+                                        <p:tgtEl>
+                                          <p:spTgt spid="2"/>
                                         </p:tgtEl>
                                         <p:attrNameLst>
                                           <p:attrName>style.visibility</p:attrName>
@@ -14360,6 +14317,7 @@
       <p:bldP spid="9" grpId="0" animBg="1"/>
       <p:bldP spid="10" grpId="0" animBg="1"/>
       <p:bldP spid="13" grpId="0" animBg="1"/>
+      <p:bldP spid="2" grpId="0" animBg="1"/>
     </p:bldLst>
   </p:timing>
 </p:sld>
@@ -14553,6 +14511,13 @@
       <p:transition spd="slow" advClick="0" advTm="5000"/>
     </mc:Fallback>
   </mc:AlternateContent>
+  <p:timing>
+    <p:tnLst>
+      <p:par>
+        <p:cTn id="1" dur="indefinite" restart="never" nodeType="tmRoot"/>
+      </p:par>
+    </p:tnLst>
+  </p:timing>
 </p:sld>
 </file>
 
@@ -14585,13 +14550,13 @@
         </p:nvSpPr>
         <p:spPr>
           <a:xfrm>
-            <a:off x="190402" y="1423685"/>
-            <a:ext cx="11818096" cy="4973505"/>
+            <a:off x="415484" y="1451820"/>
+            <a:ext cx="10416639" cy="3907970"/>
           </a:xfrm>
         </p:spPr>
         <p:txBody>
           <a:bodyPr>
-            <a:normAutofit/>
+            <a:normAutofit fontScale="85000" lnSpcReduction="10000"/>
           </a:bodyPr>
           <a:lstStyle/>
           <a:p>
@@ -14687,31 +14652,48 @@
             </a:r>
             <a:r>
               <a:rPr lang="bg-BG" sz="3600" dirty="0"/>
-              <a:t> в устройствата за четене/запис</a:t>
-            </a:r>
+              <a:t> в устройствата за </a:t>
+            </a:r>
+            <a:r>
+              <a:rPr lang="bg-BG" sz="3600" dirty="0" smtClean="0"/>
+              <a:t>четене/запис</a:t>
+            </a:r>
+            <a:endParaRPr lang="en-US" sz="3600" dirty="0" smtClean="0"/>
           </a:p>
           <a:p>
             <a:pPr>
               <a:lnSpc>
                 <a:spcPct val="120000"/>
               </a:lnSpc>
+              <a:buClr>
+                <a:schemeClr val="tx1"/>
+              </a:buClr>
             </a:pPr>
             <a:r>
-              <a:rPr lang="bg-BG" sz="3600" dirty="0"/>
-              <a:t>Изваждайте премахваемите НИ с </a:t>
-            </a:r>
-            <a:r>
-              <a:rPr lang="bg-BG" sz="3600" b="1" dirty="0">
+              <a:rPr lang="bg-BG" sz="3600" b="1" dirty="0" smtClean="0">
                 <a:solidFill>
                   <a:schemeClr val="bg1"/>
                 </a:solidFill>
               </a:rPr>
-              <a:t>предварителна команда </a:t>
-            </a:r>
-            <a:r>
-              <a:rPr lang="bg-BG" sz="3600" dirty="0"/>
-              <a:t>към ОС</a:t>
-            </a:r>
+              <a:t>Проверявайте</a:t>
+            </a:r>
+            <a:r>
+              <a:rPr lang="bg-BG" sz="3600" dirty="0" smtClean="0"/>
+              <a:t> и </a:t>
+            </a:r>
+            <a:r>
+              <a:rPr lang="bg-BG" sz="3600" b="1" dirty="0" smtClean="0">
+                <a:solidFill>
+                  <a:schemeClr val="bg1"/>
+                </a:solidFill>
+              </a:rPr>
+              <a:t>поправяйте</a:t>
+            </a:r>
+            <a:r>
+              <a:rPr lang="bg-BG" sz="3600" dirty="0" smtClean="0"/>
+              <a:t> НИ за грешки  в записаната информацията</a:t>
+            </a:r>
+            <a:endParaRPr lang="bg-BG" sz="3600" dirty="0"/>
           </a:p>
         </p:txBody>
       </p:sp>
@@ -14775,6 +14757,30 @@
           </a:p>
         </p:txBody>
       </p:sp>
+      <p:pic>
+        <p:nvPicPr>
+          <p:cNvPr id="6" name="Картина 5"/>
+          <p:cNvPicPr>
+            <a:picLocks noChangeAspect="1"/>
+          </p:cNvPicPr>
+          <p:nvPr/>
+        </p:nvPicPr>
+        <p:blipFill>
+          <a:blip r:embed="rId3"/>
+          <a:stretch>
+            <a:fillRect/>
+          </a:stretch>
+        </p:blipFill>
+        <p:spPr>
+          <a:xfrm>
+            <a:off x="6992446" y="4783914"/>
+            <a:ext cx="3670864" cy="1767704"/>
+          </a:xfrm>
+          <a:prstGeom prst="rect">
+            <a:avLst/>
+          </a:prstGeom>
+        </p:spPr>
+      </p:pic>
     </p:spTree>
     <p:extLst>
       <p:ext uri="{BB962C8B-B14F-4D97-AF65-F5344CB8AC3E}">
@@ -14942,6 +14948,33 @@
                                   </p:childTnLst>
                                 </p:cTn>
                               </p:par>
+                              <p:par>
+                                <p:cTn id="15" presetID="1" presetClass="entr" presetSubtype="0" fill="hold" nodeType="withEffect">
+                                  <p:stCondLst>
+                                    <p:cond delay="0"/>
+                                  </p:stCondLst>
+                                  <p:childTnLst>
+                                    <p:set>
+                                      <p:cBhvr>
+                                        <p:cTn id="16" dur="1" fill="hold">
+                                          <p:stCondLst>
+                                            <p:cond delay="0"/>
+                                          </p:stCondLst>
+                                        </p:cTn>
+                                        <p:tgtEl>
+                                          <p:spTgt spid="6"/>
+                                        </p:tgtEl>
+                                        <p:attrNameLst>
+                                          <p:attrName>style.visibility</p:attrName>
+                                        </p:attrNameLst>
+                                      </p:cBhvr>
+                                      <p:to>
+                                        <p:strVal val="visible"/>
+                                      </p:to>
+                                    </p:set>
+                                  </p:childTnLst>
+                                </p:cTn>
+                              </p:par>
                             </p:childTnLst>
                           </p:cTn>
                         </p:par>
@@ -15052,7 +15085,7 @@
       </p:sp>
       <p:pic>
         <p:nvPicPr>
-          <p:cNvPr id="8" name="Картина 7"/>
+          <p:cNvPr id="6" name="Картина 5"/>
           <p:cNvPicPr>
             <a:picLocks noChangeAspect="1"/>
           </p:cNvPicPr>
@@ -15066,32 +15099,8 @@
         </p:blipFill>
         <p:spPr>
           <a:xfrm>
-            <a:off x="1642796" y="1609036"/>
-            <a:ext cx="3997294" cy="1924896"/>
-          </a:xfrm>
-          <a:prstGeom prst="rect">
-            <a:avLst/>
-          </a:prstGeom>
-        </p:spPr>
-      </p:pic>
-      <p:pic>
-        <p:nvPicPr>
-          <p:cNvPr id="6" name="Картина 5"/>
-          <p:cNvPicPr>
-            <a:picLocks noChangeAspect="1"/>
-          </p:cNvPicPr>
-          <p:nvPr/>
-        </p:nvPicPr>
-        <p:blipFill>
-          <a:blip r:embed="rId4"/>
-          <a:stretch>
-            <a:fillRect/>
-          </a:stretch>
-        </p:blipFill>
-        <p:spPr>
-          <a:xfrm>
-            <a:off x="6018956" y="1224705"/>
-            <a:ext cx="6065178" cy="3730172"/>
+            <a:off x="3303606" y="2867079"/>
+            <a:ext cx="4971956" cy="3057825"/>
           </a:xfrm>
           <a:prstGeom prst="rect">
             <a:avLst/>
@@ -15107,14 +15116,14 @@
           <p:nvPr/>
         </p:nvPicPr>
         <p:blipFill>
-          <a:blip r:embed="rId5"/>
+          <a:blip r:embed="rId4"/>
           <a:stretch>
             <a:fillRect/>
           </a:stretch>
         </p:blipFill>
         <p:spPr>
           <a:xfrm>
-            <a:off x="2224151" y="3742876"/>
+            <a:off x="8529340" y="1845579"/>
             <a:ext cx="3037072" cy="2043000"/>
           </a:xfrm>
           <a:prstGeom prst="rect">
@@ -15124,67 +15133,408 @@
       </p:pic>
       <p:sp>
         <p:nvSpPr>
-          <p:cNvPr id="3" name="TextBox 2">
-            <a:extLst>
-              <a:ext uri="{FF2B5EF4-FFF2-40B4-BE49-F238E27FC236}">
-                <a16:creationId xmlns:a16="http://schemas.microsoft.com/office/drawing/2014/main" id="{EEF03185-9336-E4EB-9809-5A636593B872}"/>
-              </a:ext>
-            </a:extLst>
-          </p:cNvPr>
-          <p:cNvSpPr txBox="1"/>
-          <p:nvPr/>
+          <p:cNvPr id="9" name="Текстов контейнер 1"/>
+          <p:cNvSpPr>
+            <a:spLocks noGrp="1"/>
+          </p:cNvSpPr>
+          <p:nvPr>
+            <p:ph type="body" sz="quarter" idx="10"/>
+          </p:nvPr>
         </p:nvSpPr>
         <p:spPr>
           <a:xfrm>
-            <a:off x="6278665" y="3742876"/>
-            <a:ext cx="4616974" cy="2215579"/>
+            <a:off x="302944" y="1307078"/>
+            <a:ext cx="7954791" cy="2112124"/>
           </a:xfrm>
-          <a:prstGeom prst="rect">
-            <a:avLst/>
+        </p:spPr>
+        <p:txBody>
+          <a:bodyPr>
+            <a:normAutofit/>
+          </a:bodyPr>
+          <a:lstStyle/>
+          <a:p>
+            <a:pPr>
+              <a:lnSpc>
+                <a:spcPct val="120000"/>
+              </a:lnSpc>
+            </a:pPr>
+            <a:r>
+              <a:rPr lang="bg-BG" sz="3600" dirty="0" smtClean="0"/>
+              <a:t>Изваждайте </a:t>
+            </a:r>
+            <a:r>
+              <a:rPr lang="bg-BG" sz="3600" dirty="0"/>
+              <a:t>премахваемите НИ с </a:t>
+            </a:r>
+            <a:r>
+              <a:rPr lang="bg-BG" sz="3600" b="1" dirty="0">
+                <a:solidFill>
+                  <a:schemeClr val="bg1"/>
+                </a:solidFill>
+              </a:rPr>
+              <a:t>предварителна команда </a:t>
+            </a:r>
+            <a:r>
+              <a:rPr lang="bg-BG" sz="3600" dirty="0"/>
+              <a:t>към ОС</a:t>
+            </a:r>
+          </a:p>
+        </p:txBody>
+      </p:sp>
+      <p:sp>
+        <p:nvSpPr>
+          <p:cNvPr id="10" name="Закръглено правоъгълно изнесено означение 9"/>
+          <p:cNvSpPr/>
+          <p:nvPr/>
+        </p:nvSpPr>
+        <p:spPr bwMode="auto">
+          <a:xfrm>
+            <a:off x="480691" y="5601795"/>
+            <a:ext cx="2231949" cy="1104246"/>
+          </a:xfrm>
+          <a:prstGeom prst="wedgeRoundRectCallout">
+            <a:avLst>
+              <a:gd name="adj1" fmla="val 204957"/>
+              <a:gd name="adj2" fmla="val -103124"/>
+              <a:gd name="adj3" fmla="val 16667"/>
+            </a:avLst>
           </a:prstGeom>
-          <a:ln/>
+          <a:solidFill>
+            <a:schemeClr val="dk2">
+              <a:alpha val="80000"/>
+            </a:schemeClr>
+          </a:solidFill>
+          <a:ln w="19050">
+            <a:solidFill>
+              <a:schemeClr val="tx1">
+                <a:lumMod val="75000"/>
+                <a:alpha val="80000"/>
+              </a:schemeClr>
+            </a:solidFill>
+          </a:ln>
+          <a:effectLst/>
         </p:spPr>
         <p:style>
           <a:lnRef idx="2">
-            <a:schemeClr val="accent2"/>
+            <a:schemeClr val="accent1">
+              <a:shade val="50000"/>
+            </a:schemeClr>
           </a:lnRef>
-          <a:fillRef idx="1">
-            <a:schemeClr val="lt1"/>
+          <a:fillRef idx="1001">
+            <a:schemeClr val="dk2"/>
           </a:fillRef>
           <a:effectRef idx="0">
-            <a:schemeClr val="accent2"/>
+            <a:schemeClr val="accent1"/>
           </a:effectRef>
           <a:fontRef idx="minor">
-            <a:schemeClr val="dk1"/>
+            <a:schemeClr val="lt1"/>
           </a:fontRef>
         </p:style>
         <p:txBody>
-          <a:bodyPr vert="horz" wrap="square" lIns="144000" tIns="108000" rIns="144000" bIns="108000" rtlCol="0">
-            <a:spAutoFit/>
+          <a:bodyPr rot="0" spcFirstLastPara="0" vertOverflow="overflow" horzOverflow="overflow" vert="horz" wrap="square" lIns="91440" tIns="45720" rIns="91440" bIns="45720" numCol="1" spcCol="0" rtlCol="0" fromWordArt="0" anchor="ctr" anchorCtr="0" forceAA="0" compatLnSpc="1">
+            <a:prstTxWarp prst="textNoShape">
+              <a:avLst/>
+            </a:prstTxWarp>
+            <a:noAutofit/>
           </a:bodyPr>
           <a:lstStyle/>
           <a:p>
-            <a:pPr algn="l" eaLnBrk="0" hangingPunct="0">
-              <a:lnSpc>
-                <a:spcPct val="110000"/>
-              </a:lnSpc>
-              <a:buClr>
-                <a:schemeClr val="accent5">
-                  <a:lumMod val="40000"/>
-                  <a:lumOff val="60000"/>
-                </a:schemeClr>
-              </a:buClr>
-              <a:buSzPct val="70000"/>
-            </a:pPr>
-            <a:r>
-              <a:rPr lang="en-BG" sz="4000" dirty="0"/>
-              <a:t>TODO:</a:t>
-            </a:r>
-            <a:r>
-              <a:rPr lang="bg-BG" sz="4000" dirty="0"/>
-              <a:t> Да се добавят балони с обяснения</a:t>
-            </a:r>
-            <a:endParaRPr lang="en-BG" sz="4000" dirty="0"/>
+            <a:pPr algn="ctr"/>
+            <a:r>
+              <a:rPr lang="bg-BG" sz="2800" b="1" dirty="0" smtClean="0">
+                <a:solidFill>
+                  <a:srgbClr val="FFFFFF"/>
+                </a:solidFill>
+                <a:effectLst>
+                  <a:outerShdw blurRad="38100" dist="38100" dir="2700000" algn="tl">
+                    <a:srgbClr val="000000">
+                      <a:alpha val="43137"/>
+                    </a:srgbClr>
+                  </a:outerShdw>
+                </a:effectLst>
+              </a:rPr>
+              <a:t>Изберете носителя</a:t>
+            </a:r>
+            <a:endParaRPr lang="bg-BG" sz="2800" b="1" dirty="0">
+              <a:solidFill>
+                <a:srgbClr val="FFFFFF"/>
+              </a:solidFill>
+              <a:effectLst>
+                <a:outerShdw blurRad="38100" dist="38100" dir="2700000" algn="tl">
+                  <a:srgbClr val="000000">
+                    <a:alpha val="43137"/>
+                  </a:srgbClr>
+                </a:outerShdw>
+              </a:effectLst>
+            </a:endParaRPr>
+          </a:p>
+        </p:txBody>
+      </p:sp>
+      <p:sp>
+        <p:nvSpPr>
+          <p:cNvPr id="11" name="Закръглено правоъгълно изнесено означение 10"/>
+          <p:cNvSpPr/>
+          <p:nvPr/>
+        </p:nvSpPr>
+        <p:spPr bwMode="auto">
+          <a:xfrm>
+            <a:off x="285117" y="2800132"/>
+            <a:ext cx="2878553" cy="1630538"/>
+          </a:xfrm>
+          <a:prstGeom prst="wedgeRoundRectCallout">
+            <a:avLst>
+              <a:gd name="adj1" fmla="val 169524"/>
+              <a:gd name="adj2" fmla="val 14249"/>
+              <a:gd name="adj3" fmla="val 16667"/>
+            </a:avLst>
+          </a:prstGeom>
+          <a:solidFill>
+            <a:schemeClr val="dk2">
+              <a:alpha val="80000"/>
+            </a:schemeClr>
+          </a:solidFill>
+          <a:ln w="19050">
+            <a:solidFill>
+              <a:schemeClr val="tx1">
+                <a:lumMod val="75000"/>
+                <a:alpha val="80000"/>
+              </a:schemeClr>
+            </a:solidFill>
+          </a:ln>
+          <a:effectLst/>
+        </p:spPr>
+        <p:style>
+          <a:lnRef idx="2">
+            <a:schemeClr val="accent1">
+              <a:shade val="50000"/>
+            </a:schemeClr>
+          </a:lnRef>
+          <a:fillRef idx="1001">
+            <a:schemeClr val="dk2"/>
+          </a:fillRef>
+          <a:effectRef idx="0">
+            <a:schemeClr val="accent1"/>
+          </a:effectRef>
+          <a:fontRef idx="minor">
+            <a:schemeClr val="lt1"/>
+          </a:fontRef>
+        </p:style>
+        <p:txBody>
+          <a:bodyPr rot="0" spcFirstLastPara="0" vertOverflow="overflow" horzOverflow="overflow" vert="horz" wrap="square" lIns="91440" tIns="45720" rIns="91440" bIns="45720" numCol="1" spcCol="0" rtlCol="0" fromWordArt="0" anchor="ctr" anchorCtr="0" forceAA="0" compatLnSpc="1">
+            <a:prstTxWarp prst="textNoShape">
+              <a:avLst/>
+            </a:prstTxWarp>
+            <a:noAutofit/>
+          </a:bodyPr>
+          <a:lstStyle/>
+          <a:p>
+            <a:pPr algn="ctr"/>
+            <a:r>
+              <a:rPr lang="bg-BG" sz="2800" b="1" dirty="0" smtClean="0">
+                <a:solidFill>
+                  <a:srgbClr val="FFFFFF"/>
+                </a:solidFill>
+                <a:effectLst>
+                  <a:outerShdw blurRad="38100" dist="38100" dir="2700000" algn="tl">
+                    <a:srgbClr val="000000">
+                      <a:alpha val="43137"/>
+                    </a:srgbClr>
+                  </a:outerShdw>
+                </a:effectLst>
+              </a:rPr>
+              <a:t>От </a:t>
+            </a:r>
+            <a:r>
+              <a:rPr lang="bg-BG" sz="2800" b="1" dirty="0" smtClean="0">
+                <a:solidFill>
+                  <a:schemeClr val="bg1"/>
+                </a:solidFill>
+                <a:effectLst>
+                  <a:outerShdw blurRad="38100" dist="38100" dir="2700000" algn="tl">
+                    <a:srgbClr val="000000">
+                      <a:alpha val="43137"/>
+                    </a:srgbClr>
+                  </a:outerShdw>
+                </a:effectLst>
+              </a:rPr>
+              <a:t>контекстното</a:t>
+            </a:r>
+            <a:r>
+              <a:rPr lang="bg-BG" sz="2800" b="1" dirty="0" smtClean="0">
+                <a:solidFill>
+                  <a:srgbClr val="FFFFFF"/>
+                </a:solidFill>
+                <a:effectLst>
+                  <a:outerShdw blurRad="38100" dist="38100" dir="2700000" algn="tl">
+                    <a:srgbClr val="000000">
+                      <a:alpha val="43137"/>
+                    </a:srgbClr>
+                  </a:outerShdw>
+                </a:effectLst>
+              </a:rPr>
+              <a:t> меню изберете </a:t>
+            </a:r>
+            <a:r>
+              <a:rPr lang="bg-BG" sz="2800" b="1" dirty="0" smtClean="0">
+                <a:solidFill>
+                  <a:schemeClr val="bg1"/>
+                </a:solidFill>
+                <a:effectLst>
+                  <a:outerShdw blurRad="38100" dist="38100" dir="2700000" algn="tl">
+                    <a:srgbClr val="000000">
+                      <a:alpha val="43137"/>
+                    </a:srgbClr>
+                  </a:outerShdw>
+                </a:effectLst>
+              </a:rPr>
+              <a:t>Извади</a:t>
+            </a:r>
+            <a:endParaRPr lang="bg-BG" sz="2800" b="1" dirty="0">
+              <a:solidFill>
+                <a:schemeClr val="bg1"/>
+              </a:solidFill>
+              <a:effectLst>
+                <a:outerShdw blurRad="38100" dist="38100" dir="2700000" algn="tl">
+                  <a:srgbClr val="000000">
+                    <a:alpha val="43137"/>
+                  </a:srgbClr>
+                </a:outerShdw>
+              </a:effectLst>
+            </a:endParaRPr>
+          </a:p>
+        </p:txBody>
+      </p:sp>
+      <p:sp>
+        <p:nvSpPr>
+          <p:cNvPr id="12" name="Закръглено правоъгълно изнесено означение 11"/>
+          <p:cNvSpPr/>
+          <p:nvPr/>
+        </p:nvSpPr>
+        <p:spPr bwMode="auto">
+          <a:xfrm>
+            <a:off x="8529340" y="4568396"/>
+            <a:ext cx="3056200" cy="1828800"/>
+          </a:xfrm>
+          <a:prstGeom prst="wedgeRoundRectCallout">
+            <a:avLst>
+              <a:gd name="adj1" fmla="val -19094"/>
+              <a:gd name="adj2" fmla="val -89419"/>
+              <a:gd name="adj3" fmla="val 16667"/>
+            </a:avLst>
+          </a:prstGeom>
+          <a:solidFill>
+            <a:schemeClr val="dk2">
+              <a:alpha val="80000"/>
+            </a:schemeClr>
+          </a:solidFill>
+          <a:ln w="19050">
+            <a:solidFill>
+              <a:schemeClr val="tx1">
+                <a:lumMod val="75000"/>
+                <a:alpha val="80000"/>
+              </a:schemeClr>
+            </a:solidFill>
+          </a:ln>
+          <a:effectLst/>
+        </p:spPr>
+        <p:style>
+          <a:lnRef idx="2">
+            <a:schemeClr val="accent1">
+              <a:shade val="50000"/>
+            </a:schemeClr>
+          </a:lnRef>
+          <a:fillRef idx="1001">
+            <a:schemeClr val="dk2"/>
+          </a:fillRef>
+          <a:effectRef idx="0">
+            <a:schemeClr val="accent1"/>
+          </a:effectRef>
+          <a:fontRef idx="minor">
+            <a:schemeClr val="lt1"/>
+          </a:fontRef>
+        </p:style>
+        <p:txBody>
+          <a:bodyPr rot="0" spcFirstLastPara="0" vertOverflow="overflow" horzOverflow="overflow" vert="horz" wrap="square" lIns="91440" tIns="45720" rIns="91440" bIns="45720" numCol="1" spcCol="0" rtlCol="0" fromWordArt="0" anchor="ctr" anchorCtr="0" forceAA="0" compatLnSpc="1">
+            <a:prstTxWarp prst="textNoShape">
+              <a:avLst/>
+            </a:prstTxWarp>
+            <a:noAutofit/>
+          </a:bodyPr>
+          <a:lstStyle/>
+          <a:p>
+            <a:pPr algn="ctr"/>
+            <a:r>
+              <a:rPr lang="bg-BG" sz="2800" b="1" dirty="0" smtClean="0">
+                <a:solidFill>
+                  <a:srgbClr val="FFFFFF"/>
+                </a:solidFill>
+                <a:effectLst>
+                  <a:outerShdw blurRad="38100" dist="38100" dir="2700000" algn="tl">
+                    <a:srgbClr val="000000">
+                      <a:alpha val="43137"/>
+                    </a:srgbClr>
+                  </a:outerShdw>
+                </a:effectLst>
+              </a:rPr>
+              <a:t>Или укажете от лентата с </a:t>
+            </a:r>
+            <a:r>
+              <a:rPr lang="bg-BG" sz="2800" b="1" dirty="0" smtClean="0">
+                <a:solidFill>
+                  <a:schemeClr val="bg2"/>
+                </a:solidFill>
+                <a:effectLst>
+                  <a:outerShdw blurRad="38100" dist="38100" dir="2700000" algn="tl">
+                    <a:srgbClr val="000000">
+                      <a:alpha val="43137"/>
+                    </a:srgbClr>
+                  </a:outerShdw>
+                </a:effectLst>
+              </a:rPr>
+              <a:t>програмите</a:t>
+            </a:r>
+            <a:r>
+              <a:rPr lang="bg-BG" sz="2800" b="1" dirty="0" smtClean="0">
+                <a:solidFill>
+                  <a:srgbClr val="FFFFFF"/>
+                </a:solidFill>
+                <a:effectLst>
+                  <a:outerShdw blurRad="38100" dist="38100" dir="2700000" algn="tl">
+                    <a:srgbClr val="000000">
+                      <a:alpha val="43137"/>
+                    </a:srgbClr>
+                  </a:outerShdw>
+                </a:effectLst>
+              </a:rPr>
+              <a:t> на </a:t>
+            </a:r>
+            <a:r>
+              <a:rPr lang="bg-BG" sz="2800" b="1" dirty="0" smtClean="0">
+                <a:solidFill>
+                  <a:schemeClr val="bg1"/>
+                </a:solidFill>
+                <a:effectLst>
+                  <a:outerShdw blurRad="38100" dist="38100" dir="2700000" algn="tl">
+                    <a:srgbClr val="000000">
+                      <a:alpha val="43137"/>
+                    </a:srgbClr>
+                  </a:outerShdw>
+                </a:effectLst>
+              </a:rPr>
+              <a:t>фонов режим</a:t>
+            </a:r>
+            <a:endParaRPr lang="bg-BG" sz="2800" b="1" dirty="0">
+              <a:solidFill>
+                <a:schemeClr val="bg1"/>
+              </a:solidFill>
+              <a:effectLst>
+                <a:outerShdw blurRad="38100" dist="38100" dir="2700000" algn="tl">
+                  <a:srgbClr val="000000">
+                    <a:alpha val="43137"/>
+                  </a:srgbClr>
+                </a:outerShdw>
+              </a:effectLst>
+            </a:endParaRPr>
           </a:p>
         </p:txBody>
       </p:sp>
@@ -15206,246 +15556,207 @@
       <p:transition spd="slow" advClick="0" advTm="5000"/>
     </mc:Fallback>
   </mc:AlternateContent>
+  <p:timing>
+    <p:tnLst>
+      <p:par>
+        <p:cTn id="1" dur="indefinite" restart="never" nodeType="tmRoot">
+          <p:childTnLst>
+            <p:seq concurrent="1" nextAc="seek">
+              <p:cTn id="2" dur="indefinite" nodeType="mainSeq">
+                <p:childTnLst>
+                  <p:par>
+                    <p:cTn id="3" fill="hold">
+                      <p:stCondLst>
+                        <p:cond delay="indefinite"/>
+                      </p:stCondLst>
+                      <p:childTnLst>
+                        <p:par>
+                          <p:cTn id="4" fill="hold">
+                            <p:stCondLst>
+                              <p:cond delay="0"/>
+                            </p:stCondLst>
+                            <p:childTnLst>
+                              <p:par>
+                                <p:cTn id="5" presetID="1" presetClass="entr" presetSubtype="0" fill="hold" grpId="0" nodeType="clickEffect">
+                                  <p:stCondLst>
+                                    <p:cond delay="0"/>
+                                  </p:stCondLst>
+                                  <p:childTnLst>
+                                    <p:set>
+                                      <p:cBhvr>
+                                        <p:cTn id="6" dur="1" fill="hold">
+                                          <p:stCondLst>
+                                            <p:cond delay="0"/>
+                                          </p:stCondLst>
+                                        </p:cTn>
+                                        <p:tgtEl>
+                                          <p:spTgt spid="10"/>
+                                        </p:tgtEl>
+                                        <p:attrNameLst>
+                                          <p:attrName>style.visibility</p:attrName>
+                                        </p:attrNameLst>
+                                      </p:cBhvr>
+                                      <p:to>
+                                        <p:strVal val="visible"/>
+                                      </p:to>
+                                    </p:set>
+                                  </p:childTnLst>
+                                </p:cTn>
+                              </p:par>
+                            </p:childTnLst>
+                          </p:cTn>
+                        </p:par>
+                      </p:childTnLst>
+                    </p:cTn>
+                  </p:par>
+                  <p:par>
+                    <p:cTn id="7" fill="hold">
+                      <p:stCondLst>
+                        <p:cond delay="indefinite"/>
+                      </p:stCondLst>
+                      <p:childTnLst>
+                        <p:par>
+                          <p:cTn id="8" fill="hold">
+                            <p:stCondLst>
+                              <p:cond delay="0"/>
+                            </p:stCondLst>
+                            <p:childTnLst>
+                              <p:par>
+                                <p:cTn id="9" presetID="1" presetClass="entr" presetSubtype="0" fill="hold" grpId="0" nodeType="clickEffect">
+                                  <p:stCondLst>
+                                    <p:cond delay="0"/>
+                                  </p:stCondLst>
+                                  <p:childTnLst>
+                                    <p:set>
+                                      <p:cBhvr>
+                                        <p:cTn id="10" dur="1" fill="hold">
+                                          <p:stCondLst>
+                                            <p:cond delay="0"/>
+                                          </p:stCondLst>
+                                        </p:cTn>
+                                        <p:tgtEl>
+                                          <p:spTgt spid="11"/>
+                                        </p:tgtEl>
+                                        <p:attrNameLst>
+                                          <p:attrName>style.visibility</p:attrName>
+                                        </p:attrNameLst>
+                                      </p:cBhvr>
+                                      <p:to>
+                                        <p:strVal val="visible"/>
+                                      </p:to>
+                                    </p:set>
+                                  </p:childTnLst>
+                                </p:cTn>
+                              </p:par>
+                            </p:childTnLst>
+                          </p:cTn>
+                        </p:par>
+                      </p:childTnLst>
+                    </p:cTn>
+                  </p:par>
+                  <p:par>
+                    <p:cTn id="11" fill="hold">
+                      <p:stCondLst>
+                        <p:cond delay="indefinite"/>
+                      </p:stCondLst>
+                      <p:childTnLst>
+                        <p:par>
+                          <p:cTn id="12" fill="hold">
+                            <p:stCondLst>
+                              <p:cond delay="0"/>
+                            </p:stCondLst>
+                            <p:childTnLst>
+                              <p:par>
+                                <p:cTn id="13" presetID="1" presetClass="entr" presetSubtype="0" fill="hold" nodeType="clickEffect">
+                                  <p:stCondLst>
+                                    <p:cond delay="0"/>
+                                  </p:stCondLst>
+                                  <p:childTnLst>
+                                    <p:set>
+                                      <p:cBhvr>
+                                        <p:cTn id="14" dur="1" fill="hold">
+                                          <p:stCondLst>
+                                            <p:cond delay="0"/>
+                                          </p:stCondLst>
+                                        </p:cTn>
+                                        <p:tgtEl>
+                                          <p:spTgt spid="7"/>
+                                        </p:tgtEl>
+                                        <p:attrNameLst>
+                                          <p:attrName>style.visibility</p:attrName>
+                                        </p:attrNameLst>
+                                      </p:cBhvr>
+                                      <p:to>
+                                        <p:strVal val="visible"/>
+                                      </p:to>
+                                    </p:set>
+                                  </p:childTnLst>
+                                </p:cTn>
+                              </p:par>
+                              <p:par>
+                                <p:cTn id="15" presetID="1" presetClass="entr" presetSubtype="0" fill="hold" grpId="0" nodeType="withEffect">
+                                  <p:stCondLst>
+                                    <p:cond delay="0"/>
+                                  </p:stCondLst>
+                                  <p:childTnLst>
+                                    <p:set>
+                                      <p:cBhvr>
+                                        <p:cTn id="16" dur="1" fill="hold">
+                                          <p:stCondLst>
+                                            <p:cond delay="0"/>
+                                          </p:stCondLst>
+                                        </p:cTn>
+                                        <p:tgtEl>
+                                          <p:spTgt spid="12"/>
+                                        </p:tgtEl>
+                                        <p:attrNameLst>
+                                          <p:attrName>style.visibility</p:attrName>
+                                        </p:attrNameLst>
+                                      </p:cBhvr>
+                                      <p:to>
+                                        <p:strVal val="visible"/>
+                                      </p:to>
+                                    </p:set>
+                                  </p:childTnLst>
+                                </p:cTn>
+                              </p:par>
+                            </p:childTnLst>
+                          </p:cTn>
+                        </p:par>
+                      </p:childTnLst>
+                    </p:cTn>
+                  </p:par>
+                </p:childTnLst>
+              </p:cTn>
+              <p:prevCondLst>
+                <p:cond evt="onPrev" delay="0">
+                  <p:tgtEl>
+                    <p:sldTgt/>
+                  </p:tgtEl>
+                </p:cond>
+              </p:prevCondLst>
+              <p:nextCondLst>
+                <p:cond evt="onNext" delay="0">
+                  <p:tgtEl>
+                    <p:sldTgt/>
+                  </p:tgtEl>
+                </p:cond>
+              </p:nextCondLst>
+            </p:seq>
+          </p:childTnLst>
+        </p:cTn>
+      </p:par>
+    </p:tnLst>
+    <p:bldLst>
+      <p:bldP spid="10" grpId="0" animBg="1"/>
+      <p:bldP spid="11" grpId="0" animBg="1"/>
+      <p:bldP spid="12" grpId="0" animBg="1"/>
+    </p:bldLst>
+  </p:timing>
 </p:sld>
 </file>
 
 <file path=ppt/slides/slide18.xml><?xml version="1.0" encoding="utf-8"?>
-<p:sld xmlns:a="http://schemas.openxmlformats.org/drawingml/2006/main" xmlns:r="http://schemas.openxmlformats.org/officeDocument/2006/relationships" xmlns:p="http://schemas.openxmlformats.org/presentationml/2006/main">
-  <p:cSld>
-    <p:spTree>
-      <p:nvGrpSpPr>
-        <p:cNvPr id="1" name=""/>
-        <p:cNvGrpSpPr/>
-        <p:nvPr/>
-      </p:nvGrpSpPr>
-      <p:grpSpPr>
-        <a:xfrm>
-          <a:off x="0" y="0"/>
-          <a:ext cx="0" cy="0"/>
-          <a:chOff x="0" y="0"/>
-          <a:chExt cx="0" cy="0"/>
-        </a:xfrm>
-      </p:grpSpPr>
-      <p:sp>
-        <p:nvSpPr>
-          <p:cNvPr id="5" name="Title 4">
-            <a:extLst>
-              <a:ext uri="{FF2B5EF4-FFF2-40B4-BE49-F238E27FC236}">
-                <a16:creationId xmlns:a16="http://schemas.microsoft.com/office/drawing/2014/main" id="{52257ABB-6E9B-4338-8204-41F5119CB79D}"/>
-              </a:ext>
-            </a:extLst>
-          </p:cNvPr>
-          <p:cNvSpPr>
-            <a:spLocks noGrp="1"/>
-          </p:cNvSpPr>
-          <p:nvPr>
-            <p:ph type="title"/>
-          </p:nvPr>
-        </p:nvSpPr>
-        <p:spPr/>
-        <p:txBody>
-          <a:bodyPr>
-            <a:normAutofit/>
-          </a:bodyPr>
-          <a:lstStyle/>
-          <a:p>
-            <a:r>
-              <a:rPr lang="bg-BG" sz="4000" dirty="0"/>
-              <a:t>Правила за работа с НИ (3)</a:t>
-            </a:r>
-          </a:p>
-        </p:txBody>
-      </p:sp>
-      <p:sp>
-        <p:nvSpPr>
-          <p:cNvPr id="4" name="Slide Number Placeholder 3">
-            <a:extLst>
-              <a:ext uri="{FF2B5EF4-FFF2-40B4-BE49-F238E27FC236}">
-                <a16:creationId xmlns:a16="http://schemas.microsoft.com/office/drawing/2014/main" id="{4AE49D84-4CEE-41B3-AA53-BEBC7EFF3AA7}"/>
-              </a:ext>
-            </a:extLst>
-          </p:cNvPr>
-          <p:cNvSpPr>
-            <a:spLocks noGrp="1"/>
-          </p:cNvSpPr>
-          <p:nvPr>
-            <p:ph type="sldNum" sz="quarter" idx="13"/>
-          </p:nvPr>
-        </p:nvSpPr>
-        <p:spPr/>
-        <p:txBody>
-          <a:bodyPr/>
-          <a:lstStyle/>
-          <a:p>
-            <a:fld id="{C014DD1E-5D91-48A3-AD6D-45FBA980D106}" type="slidenum">
-              <a:rPr lang="en-US" smtClean="0"/>
-              <a:pPr/>
-              <a:t>18</a:t>
-            </a:fld>
-            <a:endParaRPr lang="en-US" dirty="0"/>
-          </a:p>
-        </p:txBody>
-      </p:sp>
-      <p:pic>
-        <p:nvPicPr>
-          <p:cNvPr id="2" name="Картина 1"/>
-          <p:cNvPicPr>
-            <a:picLocks noChangeAspect="1"/>
-          </p:cNvPicPr>
-          <p:nvPr/>
-        </p:nvPicPr>
-        <p:blipFill>
-          <a:blip r:embed="rId3"/>
-          <a:stretch>
-            <a:fillRect/>
-          </a:stretch>
-        </p:blipFill>
-        <p:spPr>
-          <a:xfrm>
-            <a:off x="2158385" y="2297269"/>
-            <a:ext cx="6065178" cy="3730172"/>
-          </a:xfrm>
-          <a:prstGeom prst="rect">
-            <a:avLst/>
-          </a:prstGeom>
-        </p:spPr>
-      </p:pic>
-      <p:pic>
-        <p:nvPicPr>
-          <p:cNvPr id="3" name="Картина 2"/>
-          <p:cNvPicPr>
-            <a:picLocks noChangeAspect="1"/>
-          </p:cNvPicPr>
-          <p:nvPr/>
-        </p:nvPicPr>
-        <p:blipFill>
-          <a:blip r:embed="rId4"/>
-          <a:stretch>
-            <a:fillRect/>
-          </a:stretch>
-        </p:blipFill>
-        <p:spPr>
-          <a:xfrm>
-            <a:off x="6095996" y="3428999"/>
-            <a:ext cx="7" cy="2"/>
-          </a:xfrm>
-          <a:prstGeom prst="rect">
-            <a:avLst/>
-          </a:prstGeom>
-        </p:spPr>
-      </p:pic>
-      <p:pic>
-        <p:nvPicPr>
-          <p:cNvPr id="9" name="Картина 8"/>
-          <p:cNvPicPr>
-            <a:picLocks noChangeAspect="1"/>
-          </p:cNvPicPr>
-          <p:nvPr/>
-        </p:nvPicPr>
-        <p:blipFill>
-          <a:blip r:embed="rId5"/>
-          <a:stretch>
-            <a:fillRect/>
-          </a:stretch>
-        </p:blipFill>
-        <p:spPr>
-          <a:xfrm>
-            <a:off x="8567999" y="3641541"/>
-            <a:ext cx="3037072" cy="2043000"/>
-          </a:xfrm>
-          <a:prstGeom prst="rect">
-            <a:avLst/>
-          </a:prstGeom>
-        </p:spPr>
-      </p:pic>
-      <p:sp>
-        <p:nvSpPr>
-          <p:cNvPr id="7" name="TextBox 6">
-            <a:extLst>
-              <a:ext uri="{FF2B5EF4-FFF2-40B4-BE49-F238E27FC236}">
-                <a16:creationId xmlns:a16="http://schemas.microsoft.com/office/drawing/2014/main" id="{445637A3-C269-01E4-37B6-031DCBE69829}"/>
-              </a:ext>
-            </a:extLst>
-          </p:cNvPr>
-          <p:cNvSpPr txBox="1"/>
-          <p:nvPr/>
-        </p:nvSpPr>
-        <p:spPr>
-          <a:xfrm>
-            <a:off x="5780953" y="1821096"/>
-            <a:ext cx="4616974" cy="2215579"/>
-          </a:xfrm>
-          <a:prstGeom prst="rect">
-            <a:avLst/>
-          </a:prstGeom>
-          <a:ln/>
-        </p:spPr>
-        <p:style>
-          <a:lnRef idx="2">
-            <a:schemeClr val="accent2"/>
-          </a:lnRef>
-          <a:fillRef idx="1">
-            <a:schemeClr val="lt1"/>
-          </a:fillRef>
-          <a:effectRef idx="0">
-            <a:schemeClr val="accent2"/>
-          </a:effectRef>
-          <a:fontRef idx="minor">
-            <a:schemeClr val="dk1"/>
-          </a:fontRef>
-        </p:style>
-        <p:txBody>
-          <a:bodyPr vert="horz" wrap="square" lIns="144000" tIns="108000" rIns="144000" bIns="108000" rtlCol="0">
-            <a:spAutoFit/>
-          </a:bodyPr>
-          <a:lstStyle/>
-          <a:p>
-            <a:pPr algn="l" eaLnBrk="0" hangingPunct="0">
-              <a:lnSpc>
-                <a:spcPct val="110000"/>
-              </a:lnSpc>
-              <a:buClr>
-                <a:schemeClr val="accent5">
-                  <a:lumMod val="40000"/>
-                  <a:lumOff val="60000"/>
-                </a:schemeClr>
-              </a:buClr>
-              <a:buSzPct val="70000"/>
-            </a:pPr>
-            <a:r>
-              <a:rPr lang="en-BG" sz="4000" dirty="0"/>
-              <a:t>TODO:</a:t>
-            </a:r>
-            <a:r>
-              <a:rPr lang="bg-BG" sz="4000" dirty="0"/>
-              <a:t> Да се добавят балони с обяснения</a:t>
-            </a:r>
-            <a:endParaRPr lang="en-BG" sz="4000" dirty="0"/>
-          </a:p>
-        </p:txBody>
-      </p:sp>
-    </p:spTree>
-    <p:extLst>
-      <p:ext uri="{BB962C8B-B14F-4D97-AF65-F5344CB8AC3E}">
-        <p14:creationId xmlns:p14="http://schemas.microsoft.com/office/powerpoint/2010/main" val="4189934394"/>
-      </p:ext>
-    </p:extLst>
-  </p:cSld>
-  <p:clrMapOvr>
-    <a:masterClrMapping/>
-  </p:clrMapOvr>
-  <mc:AlternateContent xmlns:mc="http://schemas.openxmlformats.org/markup-compatibility/2006" xmlns:p14="http://schemas.microsoft.com/office/powerpoint/2010/main">
-    <mc:Choice Requires="p14">
-      <p:transition spd="slow" p14:dur="2000" advClick="0" advTm="5000"/>
-    </mc:Choice>
-    <mc:Fallback xmlns="">
-      <p:transition spd="slow" advClick="0" advTm="5000"/>
-    </mc:Fallback>
-  </mc:AlternateContent>
-</p:sld>
-</file>
-
-<file path=ppt/slides/slide19.xml><?xml version="1.0" encoding="utf-8"?>
 <p:sld xmlns:a="http://schemas.openxmlformats.org/drawingml/2006/main" xmlns:r="http://schemas.openxmlformats.org/officeDocument/2006/relationships" xmlns:p="http://schemas.openxmlformats.org/presentationml/2006/main">
   <p:cSld>
     <p:spTree>
@@ -15605,7 +15916,7 @@
             <a:fld id="{C014DD1E-5D91-48A3-AD6D-45FBA980D106}" type="slidenum">
               <a:rPr lang="en-US" smtClean="0"/>
               <a:pPr/>
-              <a:t>19</a:t>
+              <a:t>18</a:t>
             </a:fld>
             <a:endParaRPr lang="en-US" dirty="0"/>
           </a:p>
@@ -16642,6 +16953,84 @@
 </p:sld>
 </file>
 
+<file path=ppt/slides/slide19.xml><?xml version="1.0" encoding="utf-8"?>
+<p:sld xmlns:a="http://schemas.openxmlformats.org/drawingml/2006/main" xmlns:r="http://schemas.openxmlformats.org/officeDocument/2006/relationships" xmlns:p="http://schemas.openxmlformats.org/presentationml/2006/main">
+  <p:cSld>
+    <p:spTree>
+      <p:nvGrpSpPr>
+        <p:cNvPr id="1" name=""/>
+        <p:cNvGrpSpPr/>
+        <p:nvPr/>
+      </p:nvGrpSpPr>
+      <p:grpSpPr>
+        <a:xfrm>
+          <a:off x="0" y="0"/>
+          <a:ext cx="0" cy="0"/>
+          <a:chOff x="0" y="0"/>
+          <a:chExt cx="0" cy="0"/>
+        </a:xfrm>
+      </p:grpSpPr>
+      <p:sp>
+        <p:nvSpPr>
+          <p:cNvPr id="3" name="Text Placeholder 2"/>
+          <p:cNvSpPr>
+            <a:spLocks noGrp="1"/>
+          </p:cNvSpPr>
+          <p:nvPr>
+            <p:ph type="body" sz="quarter" idx="4294967295"/>
+          </p:nvPr>
+        </p:nvSpPr>
+        <p:spPr>
+          <a:xfrm>
+            <a:off x="0" y="6400800"/>
+            <a:ext cx="12114213" cy="363538"/>
+          </a:xfrm>
+        </p:spPr>
+        <p:txBody>
+          <a:bodyPr>
+            <a:normAutofit fontScale="62500" lnSpcReduction="20000"/>
+          </a:bodyPr>
+          <a:lstStyle/>
+          <a:p>
+            <a:pPr algn="ctr"/>
+            <a:r>
+              <a:rPr lang="en-US" dirty="0">
+                <a:hlinkClick r:id="rId3"/>
+              </a:rPr>
+              <a:t>https://softuni.bg/opencourses/train-the-trainers</a:t>
+            </a:r>
+            <a:endParaRPr lang="en-US" dirty="0"/>
+          </a:p>
+        </p:txBody>
+      </p:sp>
+    </p:spTree>
+    <p:extLst>
+      <p:ext uri="{BB962C8B-B14F-4D97-AF65-F5344CB8AC3E}">
+        <p14:creationId xmlns:p14="http://schemas.microsoft.com/office/powerpoint/2010/main" val="2856839338"/>
+      </p:ext>
+    </p:extLst>
+  </p:cSld>
+  <p:clrMapOvr>
+    <a:masterClrMapping/>
+  </p:clrMapOvr>
+  <mc:AlternateContent xmlns:mc="http://schemas.openxmlformats.org/markup-compatibility/2006" xmlns:p14="http://schemas.microsoft.com/office/powerpoint/2010/main">
+    <mc:Choice Requires="p14">
+      <p:transition spd="slow" p14:dur="2000" advClick="0" advTm="5000"/>
+    </mc:Choice>
+    <mc:Fallback xmlns="">
+      <p:transition spd="slow" advClick="0" advTm="5000"/>
+    </mc:Fallback>
+  </mc:AlternateContent>
+  <p:timing>
+    <p:tnLst>
+      <p:par>
+        <p:cTn id="1" dur="indefinite" restart="never" nodeType="tmRoot"/>
+      </p:par>
+    </p:tnLst>
+  </p:timing>
+</p:sld>
+</file>
+
 <file path=ppt/slides/slide2.xml><?xml version="1.0" encoding="utf-8"?>
 <p:sld xmlns:a="http://schemas.openxmlformats.org/drawingml/2006/main" xmlns:r="http://schemas.openxmlformats.org/officeDocument/2006/relationships" xmlns:p="http://schemas.openxmlformats.org/presentationml/2006/main">
   <p:cSld>
@@ -17158,77 +17547,6 @@
       </p:grpSpPr>
       <p:sp>
         <p:nvSpPr>
-          <p:cNvPr id="3" name="Text Placeholder 2"/>
-          <p:cNvSpPr>
-            <a:spLocks noGrp="1"/>
-          </p:cNvSpPr>
-          <p:nvPr>
-            <p:ph type="body" sz="quarter" idx="4294967295"/>
-          </p:nvPr>
-        </p:nvSpPr>
-        <p:spPr>
-          <a:xfrm>
-            <a:off x="0" y="6400800"/>
-            <a:ext cx="12114213" cy="363538"/>
-          </a:xfrm>
-        </p:spPr>
-        <p:txBody>
-          <a:bodyPr>
-            <a:normAutofit fontScale="62500" lnSpcReduction="20000"/>
-          </a:bodyPr>
-          <a:lstStyle/>
-          <a:p>
-            <a:pPr algn="ctr"/>
-            <a:r>
-              <a:rPr lang="en-US" dirty="0">
-                <a:hlinkClick r:id="rId3"/>
-              </a:rPr>
-              <a:t>https://softuni.bg/opencourses/train-the-trainers</a:t>
-            </a:r>
-            <a:endParaRPr lang="en-US" dirty="0"/>
-          </a:p>
-        </p:txBody>
-      </p:sp>
-    </p:spTree>
-    <p:extLst>
-      <p:ext uri="{BB962C8B-B14F-4D97-AF65-F5344CB8AC3E}">
-        <p14:creationId xmlns:p14="http://schemas.microsoft.com/office/powerpoint/2010/main" val="2856839338"/>
-      </p:ext>
-    </p:extLst>
-  </p:cSld>
-  <p:clrMapOvr>
-    <a:masterClrMapping/>
-  </p:clrMapOvr>
-  <mc:AlternateContent xmlns:mc="http://schemas.openxmlformats.org/markup-compatibility/2006" xmlns:p14="http://schemas.microsoft.com/office/powerpoint/2010/main">
-    <mc:Choice Requires="p14">
-      <p:transition spd="slow" p14:dur="2000" advClick="0" advTm="5000"/>
-    </mc:Choice>
-    <mc:Fallback xmlns="">
-      <p:transition spd="slow" advClick="0" advTm="5000"/>
-    </mc:Fallback>
-  </mc:AlternateContent>
-</p:sld>
-</file>
-
-<file path=ppt/slides/slide21.xml><?xml version="1.0" encoding="utf-8"?>
-<p:sld xmlns:a="http://schemas.openxmlformats.org/drawingml/2006/main" xmlns:r="http://schemas.openxmlformats.org/officeDocument/2006/relationships" xmlns:p="http://schemas.openxmlformats.org/presentationml/2006/main">
-  <p:cSld>
-    <p:spTree>
-      <p:nvGrpSpPr>
-        <p:cNvPr id="1" name=""/>
-        <p:cNvGrpSpPr/>
-        <p:nvPr/>
-      </p:nvGrpSpPr>
-      <p:grpSpPr>
-        <a:xfrm>
-          <a:off x="0" y="0"/>
-          <a:ext cx="0" cy="0"/>
-          <a:chOff x="0" y="0"/>
-          <a:chExt cx="0" cy="0"/>
-        </a:xfrm>
-      </p:grpSpPr>
-      <p:sp>
-        <p:nvSpPr>
           <p:cNvPr id="3" name="Content Placeholder 2"/>
           <p:cNvSpPr>
             <a:spLocks noGrp="1"/>
@@ -17329,7 +17647,7 @@
             <a:fld id="{C014DD1E-5D91-48A3-AD6D-45FBA980D106}" type="slidenum">
               <a:rPr lang="en-US" smtClean="0"/>
               <a:pPr/>
-              <a:t>21</a:t>
+              <a:t>20</a:t>
             </a:fld>
             <a:endParaRPr lang="en-US" dirty="0"/>
           </a:p>
@@ -17405,6 +17723,13 @@
       <p:transition spd="slow" advClick="0" advTm="5000"/>
     </mc:Fallback>
   </mc:AlternateContent>
+  <p:timing>
+    <p:tnLst>
+      <p:par>
+        <p:cTn id="1" dur="indefinite" restart="never" nodeType="tmRoot"/>
+      </p:par>
+    </p:tnLst>
+  </p:timing>
 </p:sld>
 </file>
 
@@ -17560,6 +17885,13 @@
       <p:transition spd="slow" advClick="0" advTm="5000"/>
     </mc:Fallback>
   </mc:AlternateContent>
+  <p:timing>
+    <p:tnLst>
+      <p:par>
+        <p:cTn id="1" dur="indefinite" restart="never" nodeType="tmRoot"/>
+      </p:par>
+    </p:tnLst>
+  </p:timing>
 </p:sld>
 </file>
 
@@ -17628,8 +17960,8 @@
         </p:nvSpPr>
         <p:spPr>
           <a:xfrm>
-            <a:off x="2065510" y="1429993"/>
-            <a:ext cx="9929724" cy="5276048"/>
+            <a:off x="1818766" y="1313879"/>
+            <a:ext cx="9747645" cy="4564407"/>
           </a:xfrm>
         </p:spPr>
         <p:txBody>
@@ -17669,8 +18001,73 @@
             </a:r>
             <a:r>
               <a:rPr lang="bg-BG" sz="3400" dirty="0"/>
-              <a:t>средство за трайно съхраняване на информация и след изключване на компютъра</a:t>
-            </a:r>
+              <a:t>средство за трайно съхраняване на </a:t>
+            </a:r>
+            <a:r>
+              <a:rPr lang="bg-BG" sz="3400" dirty="0" smtClean="0"/>
+              <a:t>информация</a:t>
+            </a:r>
+          </a:p>
+          <a:p>
+            <a:pPr>
+              <a:buClr>
+                <a:schemeClr val="tx1"/>
+              </a:buClr>
+            </a:pPr>
+            <a:r>
+              <a:rPr lang="bg-BG" sz="3400" dirty="0" smtClean="0"/>
+              <a:t>Служи за:</a:t>
+            </a:r>
+          </a:p>
+          <a:p>
+            <a:pPr lvl="1">
+              <a:buClr>
+                <a:schemeClr val="tx1"/>
+              </a:buClr>
+            </a:pPr>
+            <a:r>
+              <a:rPr lang="bg-BG" sz="3200" b="1" dirty="0" smtClean="0">
+                <a:solidFill>
+                  <a:schemeClr val="bg1"/>
+                </a:solidFill>
+              </a:rPr>
+              <a:t>Съхраняване</a:t>
+            </a:r>
+            <a:r>
+              <a:rPr lang="bg-BG" sz="3200" dirty="0" smtClean="0"/>
+              <a:t> на данните след изключване на компютъра</a:t>
+            </a:r>
+          </a:p>
+          <a:p>
+            <a:pPr lvl="1">
+              <a:buClr>
+                <a:schemeClr val="tx1"/>
+              </a:buClr>
+            </a:pPr>
+            <a:r>
+              <a:rPr lang="bg-BG" sz="3200" b="1" dirty="0" smtClean="0">
+                <a:solidFill>
+                  <a:schemeClr val="bg1"/>
+                </a:solidFill>
+              </a:rPr>
+              <a:t>Прехвърляне</a:t>
+            </a:r>
+            <a:r>
+              <a:rPr lang="bg-BG" sz="3200" dirty="0" smtClean="0"/>
+              <a:t> на информация към други компютри</a:t>
+            </a:r>
+          </a:p>
+          <a:p>
+            <a:pPr>
+              <a:buClr>
+                <a:schemeClr val="tx1"/>
+              </a:buClr>
+            </a:pPr>
+            <a:r>
+              <a:rPr lang="bg-BG" sz="3400" dirty="0" smtClean="0"/>
+              <a:t>Съществуват различни технологични реализации</a:t>
+            </a:r>
+            <a:endParaRPr lang="bg-BG" sz="3400" dirty="0"/>
           </a:p>
         </p:txBody>
       </p:sp>
@@ -17706,76 +18103,6 @@
               <a:rPr lang="bg-BG" sz="4000" dirty="0"/>
               <a:t>Носители на информация</a:t>
             </a:r>
-          </a:p>
-        </p:txBody>
-      </p:sp>
-      <p:sp>
-        <p:nvSpPr>
-          <p:cNvPr id="2" name="TextBox 1">
-            <a:extLst>
-              <a:ext uri="{FF2B5EF4-FFF2-40B4-BE49-F238E27FC236}">
-                <a16:creationId xmlns:a16="http://schemas.microsoft.com/office/drawing/2014/main" id="{3622BFC5-8864-58E2-CD9B-0387D56F073C}"/>
-              </a:ext>
-            </a:extLst>
-          </p:cNvPr>
-          <p:cNvSpPr txBox="1"/>
-          <p:nvPr/>
-        </p:nvSpPr>
-        <p:spPr>
-          <a:xfrm>
-            <a:off x="4271059" y="3935392"/>
-            <a:ext cx="5521124" cy="1538471"/>
-          </a:xfrm>
-          <a:prstGeom prst="rect">
-            <a:avLst/>
-          </a:prstGeom>
-          <a:ln/>
-        </p:spPr>
-        <p:style>
-          <a:lnRef idx="2">
-            <a:schemeClr val="accent2"/>
-          </a:lnRef>
-          <a:fillRef idx="1">
-            <a:schemeClr val="lt1"/>
-          </a:fillRef>
-          <a:effectRef idx="0">
-            <a:schemeClr val="accent2"/>
-          </a:effectRef>
-          <a:fontRef idx="minor">
-            <a:schemeClr val="dk1"/>
-          </a:fontRef>
-        </p:style>
-        <p:txBody>
-          <a:bodyPr vert="horz" wrap="square" lIns="144000" tIns="108000" rIns="144000" bIns="108000" rtlCol="0">
-            <a:spAutoFit/>
-          </a:bodyPr>
-          <a:lstStyle/>
-          <a:p>
-            <a:pPr algn="l" eaLnBrk="0" hangingPunct="0">
-              <a:lnSpc>
-                <a:spcPct val="110000"/>
-              </a:lnSpc>
-              <a:buClr>
-                <a:schemeClr val="accent5">
-                  <a:lumMod val="40000"/>
-                  <a:lumOff val="60000"/>
-                </a:schemeClr>
-              </a:buClr>
-              <a:buSzPct val="70000"/>
-            </a:pPr>
-            <a:r>
-              <a:rPr lang="en-BG" sz="4000" dirty="0"/>
-              <a:t>TODO: </a:t>
-            </a:r>
-            <a:r>
-              <a:rPr lang="bg-BG" sz="4000" dirty="0"/>
-              <a:t>да се добавят още 1-2 </a:t>
-            </a:r>
-            <a:r>
-              <a:rPr lang="bg-BG" sz="4000" dirty="0" err="1"/>
-              <a:t>булета</a:t>
-            </a:r>
-            <a:endParaRPr lang="en-BG" sz="4000" dirty="0"/>
           </a:p>
         </p:txBody>
       </p:sp>
@@ -17797,6 +18124,248 @@
       <p:transition spd="slow" advClick="0" advTm="5000"/>
     </mc:Fallback>
   </mc:AlternateContent>
+  <p:timing>
+    <p:tnLst>
+      <p:par>
+        <p:cTn id="1" dur="indefinite" restart="never" nodeType="tmRoot">
+          <p:childTnLst>
+            <p:seq concurrent="1" nextAc="seek">
+              <p:cTn id="2" dur="indefinite" nodeType="mainSeq">
+                <p:childTnLst>
+                  <p:par>
+                    <p:cTn id="3" fill="hold">
+                      <p:stCondLst>
+                        <p:cond delay="indefinite"/>
+                      </p:stCondLst>
+                      <p:childTnLst>
+                        <p:par>
+                          <p:cTn id="4" fill="hold">
+                            <p:stCondLst>
+                              <p:cond delay="0"/>
+                            </p:stCondLst>
+                            <p:childTnLst>
+                              <p:par>
+                                <p:cTn id="5" presetID="1" presetClass="entr" presetSubtype="0" fill="hold" grpId="0" nodeType="clickEffect">
+                                  <p:stCondLst>
+                                    <p:cond delay="0"/>
+                                  </p:stCondLst>
+                                  <p:childTnLst>
+                                    <p:set>
+                                      <p:cBhvr>
+                                        <p:cTn id="6" dur="1" fill="hold">
+                                          <p:stCondLst>
+                                            <p:cond delay="0"/>
+                                          </p:stCondLst>
+                                        </p:cTn>
+                                        <p:tgtEl>
+                                          <p:spTgt spid="6">
+                                            <p:txEl>
+                                              <p:pRg st="0" end="0"/>
+                                            </p:txEl>
+                                          </p:spTgt>
+                                        </p:tgtEl>
+                                        <p:attrNameLst>
+                                          <p:attrName>style.visibility</p:attrName>
+                                        </p:attrNameLst>
+                                      </p:cBhvr>
+                                      <p:to>
+                                        <p:strVal val="visible"/>
+                                      </p:to>
+                                    </p:set>
+                                  </p:childTnLst>
+                                </p:cTn>
+                              </p:par>
+                            </p:childTnLst>
+                          </p:cTn>
+                        </p:par>
+                      </p:childTnLst>
+                    </p:cTn>
+                  </p:par>
+                  <p:par>
+                    <p:cTn id="7" fill="hold">
+                      <p:stCondLst>
+                        <p:cond delay="indefinite"/>
+                      </p:stCondLst>
+                      <p:childTnLst>
+                        <p:par>
+                          <p:cTn id="8" fill="hold">
+                            <p:stCondLst>
+                              <p:cond delay="0"/>
+                            </p:stCondLst>
+                            <p:childTnLst>
+                              <p:par>
+                                <p:cTn id="9" presetID="1" presetClass="entr" presetSubtype="0" fill="hold" grpId="0" nodeType="clickEffect">
+                                  <p:stCondLst>
+                                    <p:cond delay="0"/>
+                                  </p:stCondLst>
+                                  <p:childTnLst>
+                                    <p:set>
+                                      <p:cBhvr>
+                                        <p:cTn id="10" dur="1" fill="hold">
+                                          <p:stCondLst>
+                                            <p:cond delay="0"/>
+                                          </p:stCondLst>
+                                        </p:cTn>
+                                        <p:tgtEl>
+                                          <p:spTgt spid="6">
+                                            <p:txEl>
+                                              <p:pRg st="1" end="1"/>
+                                            </p:txEl>
+                                          </p:spTgt>
+                                        </p:tgtEl>
+                                        <p:attrNameLst>
+                                          <p:attrName>style.visibility</p:attrName>
+                                        </p:attrNameLst>
+                                      </p:cBhvr>
+                                      <p:to>
+                                        <p:strVal val="visible"/>
+                                      </p:to>
+                                    </p:set>
+                                  </p:childTnLst>
+                                </p:cTn>
+                              </p:par>
+                              <p:par>
+                                <p:cTn id="11" presetID="1" presetClass="entr" presetSubtype="0" fill="hold" grpId="0" nodeType="withEffect">
+                                  <p:stCondLst>
+                                    <p:cond delay="0"/>
+                                  </p:stCondLst>
+                                  <p:childTnLst>
+                                    <p:set>
+                                      <p:cBhvr>
+                                        <p:cTn id="12" dur="1" fill="hold">
+                                          <p:stCondLst>
+                                            <p:cond delay="0"/>
+                                          </p:stCondLst>
+                                        </p:cTn>
+                                        <p:tgtEl>
+                                          <p:spTgt spid="6">
+                                            <p:txEl>
+                                              <p:pRg st="2" end="2"/>
+                                            </p:txEl>
+                                          </p:spTgt>
+                                        </p:tgtEl>
+                                        <p:attrNameLst>
+                                          <p:attrName>style.visibility</p:attrName>
+                                        </p:attrNameLst>
+                                      </p:cBhvr>
+                                      <p:to>
+                                        <p:strVal val="visible"/>
+                                      </p:to>
+                                    </p:set>
+                                  </p:childTnLst>
+                                </p:cTn>
+                              </p:par>
+                              <p:par>
+                                <p:cTn id="13" presetID="1" presetClass="entr" presetSubtype="0" fill="hold" grpId="0" nodeType="withEffect">
+                                  <p:stCondLst>
+                                    <p:cond delay="0"/>
+                                  </p:stCondLst>
+                                  <p:childTnLst>
+                                    <p:set>
+                                      <p:cBhvr>
+                                        <p:cTn id="14" dur="1" fill="hold">
+                                          <p:stCondLst>
+                                            <p:cond delay="0"/>
+                                          </p:stCondLst>
+                                        </p:cTn>
+                                        <p:tgtEl>
+                                          <p:spTgt spid="6">
+                                            <p:txEl>
+                                              <p:pRg st="3" end="3"/>
+                                            </p:txEl>
+                                          </p:spTgt>
+                                        </p:tgtEl>
+                                        <p:attrNameLst>
+                                          <p:attrName>style.visibility</p:attrName>
+                                        </p:attrNameLst>
+                                      </p:cBhvr>
+                                      <p:to>
+                                        <p:strVal val="visible"/>
+                                      </p:to>
+                                    </p:set>
+                                  </p:childTnLst>
+                                </p:cTn>
+                              </p:par>
+                            </p:childTnLst>
+                          </p:cTn>
+                        </p:par>
+                      </p:childTnLst>
+                    </p:cTn>
+                  </p:par>
+                  <p:par>
+                    <p:cTn id="15" fill="hold">
+                      <p:stCondLst>
+                        <p:cond delay="indefinite"/>
+                      </p:stCondLst>
+                      <p:childTnLst>
+                        <p:par>
+                          <p:cTn id="16" fill="hold">
+                            <p:stCondLst>
+                              <p:cond delay="0"/>
+                            </p:stCondLst>
+                            <p:childTnLst>
+                              <p:par>
+                                <p:cTn id="17" presetID="1" presetClass="entr" presetSubtype="0" fill="hold" grpId="0" nodeType="clickEffect">
+                                  <p:stCondLst>
+                                    <p:cond delay="0"/>
+                                  </p:stCondLst>
+                                  <p:childTnLst>
+                                    <p:set>
+                                      <p:cBhvr>
+                                        <p:cTn id="18" dur="1" fill="hold">
+                                          <p:stCondLst>
+                                            <p:cond delay="0"/>
+                                          </p:stCondLst>
+                                        </p:cTn>
+                                        <p:tgtEl>
+                                          <p:spTgt spid="6">
+                                            <p:txEl>
+                                              <p:pRg st="4" end="4"/>
+                                            </p:txEl>
+                                          </p:spTgt>
+                                        </p:tgtEl>
+                                        <p:attrNameLst>
+                                          <p:attrName>style.visibility</p:attrName>
+                                        </p:attrNameLst>
+                                      </p:cBhvr>
+                                      <p:to>
+                                        <p:strVal val="visible"/>
+                                      </p:to>
+                                    </p:set>
+                                  </p:childTnLst>
+                                </p:cTn>
+                              </p:par>
+                            </p:childTnLst>
+                          </p:cTn>
+                        </p:par>
+                      </p:childTnLst>
+                    </p:cTn>
+                  </p:par>
+                </p:childTnLst>
+              </p:cTn>
+              <p:prevCondLst>
+                <p:cond evt="onPrev" delay="0">
+                  <p:tgtEl>
+                    <p:sldTgt/>
+                  </p:tgtEl>
+                </p:cond>
+              </p:prevCondLst>
+              <p:nextCondLst>
+                <p:cond evt="onNext" delay="0">
+                  <p:tgtEl>
+                    <p:sldTgt/>
+                  </p:tgtEl>
+                </p:cond>
+              </p:nextCondLst>
+            </p:seq>
+          </p:childTnLst>
+        </p:cTn>
+      </p:par>
+    </p:tnLst>
+    <p:bldLst>
+      <p:bldP spid="6" grpId="0" build="p"/>
+    </p:bldLst>
+  </p:timing>
 </p:sld>
 </file>
 
@@ -18140,11 +18709,11 @@
   <p:clrMapOvr>
     <a:masterClrMapping/>
   </p:clrMapOvr>
-  <mc:AlternateContent xmlns:mc="http://schemas.openxmlformats.org/markup-compatibility/2006">
-    <mc:Choice xmlns:p14="http://schemas.microsoft.com/office/powerpoint/2010/main" Requires="p14">
+  <mc:AlternateContent xmlns:mc="http://schemas.openxmlformats.org/markup-compatibility/2006" xmlns:p14="http://schemas.microsoft.com/office/powerpoint/2010/main">
+    <mc:Choice Requires="p14">
       <p:transition spd="slow" p14:dur="2000" advClick="0" advTm="5000"/>
     </mc:Choice>
-    <mc:Fallback>
+    <mc:Fallback xmlns="">
       <p:transition spd="slow" advClick="0" advTm="5000"/>
     </mc:Fallback>
   </mc:AlternateContent>
@@ -18829,6 +19398,21 @@
               </a:rPr>
               <a:t>, </a:t>
             </a:r>
+            <a:r>
+              <a:rPr lang="en-US" sz="2800" b="1" dirty="0">
+                <a:solidFill>
+                  <a:srgbClr val="FFFFFF"/>
+                </a:solidFill>
+                <a:effectLst>
+                  <a:outerShdw blurRad="38100" dist="38100" dir="2700000" algn="tl">
+                    <a:srgbClr val="000000">
+                      <a:alpha val="43137"/>
+                    </a:srgbClr>
+                  </a:outerShdw>
+                </a:effectLst>
+              </a:rPr>
+              <a:t/>
+            </a:r>
             <a:br>
               <a:rPr lang="en-US" sz="2800" b="1" dirty="0">
                 <a:solidFill>
@@ -18935,6 +19519,21 @@
               </a:rPr>
               <a:t>SSD,</a:t>
             </a:r>
+            <a:r>
+              <a:rPr lang="bg-BG" sz="2800" b="1" dirty="0">
+                <a:solidFill>
+                  <a:srgbClr val="FFFFFF"/>
+                </a:solidFill>
+                <a:effectLst>
+                  <a:outerShdw blurRad="38100" dist="38100" dir="2700000" algn="tl">
+                    <a:srgbClr val="000000">
+                      <a:alpha val="43137"/>
+                    </a:srgbClr>
+                  </a:outerShdw>
+                </a:effectLst>
+              </a:rPr>
+              <a:t/>
+            </a:r>
             <a:br>
               <a:rPr lang="bg-BG" sz="2800" b="1" dirty="0">
                 <a:solidFill>
@@ -19112,72 +19711,6 @@
               </a:rPr>
               <a:t>тип М.2</a:t>
             </a:r>
-          </a:p>
-        </p:txBody>
-      </p:sp>
-      <p:sp>
-        <p:nvSpPr>
-          <p:cNvPr id="2" name="TextBox 1">
-            <a:extLst>
-              <a:ext uri="{FF2B5EF4-FFF2-40B4-BE49-F238E27FC236}">
-                <a16:creationId xmlns:a16="http://schemas.microsoft.com/office/drawing/2014/main" id="{605D9881-F2ED-CD01-6D26-632B73C342B0}"/>
-              </a:ext>
-            </a:extLst>
-          </p:cNvPr>
-          <p:cNvSpPr txBox="1"/>
-          <p:nvPr/>
-        </p:nvSpPr>
-        <p:spPr>
-          <a:xfrm>
-            <a:off x="4271059" y="3935392"/>
-            <a:ext cx="5521124" cy="1538471"/>
-          </a:xfrm>
-          <a:prstGeom prst="rect">
-            <a:avLst/>
-          </a:prstGeom>
-          <a:ln/>
-        </p:spPr>
-        <p:style>
-          <a:lnRef idx="2">
-            <a:schemeClr val="accent2"/>
-          </a:lnRef>
-          <a:fillRef idx="1">
-            <a:schemeClr val="lt1"/>
-          </a:fillRef>
-          <a:effectRef idx="0">
-            <a:schemeClr val="accent2"/>
-          </a:effectRef>
-          <a:fontRef idx="minor">
-            <a:schemeClr val="dk1"/>
-          </a:fontRef>
-        </p:style>
-        <p:txBody>
-          <a:bodyPr vert="horz" wrap="square" lIns="144000" tIns="108000" rIns="144000" bIns="108000" rtlCol="0">
-            <a:spAutoFit/>
-          </a:bodyPr>
-          <a:lstStyle/>
-          <a:p>
-            <a:pPr algn="l" eaLnBrk="0" hangingPunct="0">
-              <a:lnSpc>
-                <a:spcPct val="110000"/>
-              </a:lnSpc>
-              <a:buClr>
-                <a:schemeClr val="accent5">
-                  <a:lumMod val="40000"/>
-                  <a:lumOff val="60000"/>
-                </a:schemeClr>
-              </a:buClr>
-              <a:buSzPct val="70000"/>
-            </a:pPr>
-            <a:r>
-              <a:rPr lang="en-BG" sz="4000" dirty="0"/>
-              <a:t>TODO: </a:t>
-            </a:r>
-            <a:r>
-              <a:rPr lang="bg-BG" sz="4000" dirty="0"/>
-              <a:t>Анимации, да излизат един по един</a:t>
-            </a:r>
-            <a:endParaRPr lang="en-BG" sz="4000" dirty="0"/>
           </a:p>
         </p:txBody>
       </p:sp>
@@ -19246,39 +19779,21 @@
                                   </p:childTnLst>
                                 </p:cTn>
                               </p:par>
-                            </p:childTnLst>
-                          </p:cTn>
-                        </p:par>
-                      </p:childTnLst>
-                    </p:cTn>
-                  </p:par>
-                  <p:par>
-                    <p:cTn id="7" fill="hold">
-                      <p:stCondLst>
-                        <p:cond delay="indefinite"/>
-                      </p:stCondLst>
-                      <p:childTnLst>
-                        <p:par>
-                          <p:cTn id="8" fill="hold">
-                            <p:stCondLst>
-                              <p:cond delay="0"/>
-                            </p:stCondLst>
-                            <p:childTnLst>
                               <p:par>
-                                <p:cTn id="9" presetID="1" presetClass="entr" presetSubtype="0" fill="hold" grpId="0" nodeType="clickEffect">
+                                <p:cTn id="7" presetID="1" presetClass="entr" presetSubtype="0" fill="hold" nodeType="withEffect">
                                   <p:stCondLst>
                                     <p:cond delay="0"/>
                                   </p:stCondLst>
                                   <p:childTnLst>
                                     <p:set>
                                       <p:cBhvr>
-                                        <p:cTn id="10" dur="1" fill="hold">
+                                        <p:cTn id="8" dur="1" fill="hold">
                                           <p:stCondLst>
                                             <p:cond delay="0"/>
                                           </p:stCondLst>
                                         </p:cTn>
                                         <p:tgtEl>
-                                          <p:spTgt spid="12"/>
+                                          <p:spTgt spid="8"/>
                                         </p:tgtEl>
                                         <p:attrNameLst>
                                           <p:attrName>style.visibility</p:attrName>
@@ -19298,19 +19813,46 @@
                     </p:cTn>
                   </p:par>
                   <p:par>
-                    <p:cTn id="11" fill="hold">
+                    <p:cTn id="9" fill="hold">
                       <p:stCondLst>
                         <p:cond delay="indefinite"/>
                       </p:stCondLst>
                       <p:childTnLst>
                         <p:par>
-                          <p:cTn id="12" fill="hold">
+                          <p:cTn id="10" fill="hold">
                             <p:stCondLst>
                               <p:cond delay="0"/>
                             </p:stCondLst>
                             <p:childTnLst>
                               <p:par>
-                                <p:cTn id="13" presetID="1" presetClass="entr" presetSubtype="0" fill="hold" grpId="0" nodeType="clickEffect">
+                                <p:cTn id="11" presetID="1" presetClass="entr" presetSubtype="0" fill="hold" grpId="0" nodeType="clickEffect">
+                                  <p:stCondLst>
+                                    <p:cond delay="0"/>
+                                  </p:stCondLst>
+                                  <p:childTnLst>
+                                    <p:set>
+                                      <p:cBhvr>
+                                        <p:cTn id="12" dur="1" fill="hold">
+                                          <p:stCondLst>
+                                            <p:cond delay="0"/>
+                                          </p:stCondLst>
+                                        </p:cTn>
+                                        <p:tgtEl>
+                                          <p:spTgt spid="12"/>
+                                        </p:tgtEl>
+                                        <p:attrNameLst>
+                                          <p:attrName>style.visibility</p:attrName>
+                                        </p:attrNameLst>
+                                      </p:cBhvr>
+                                      <p:to>
+                                        <p:strVal val="visible"/>
+                                      </p:to>
+                                    </p:set>
+                                  </p:childTnLst>
+                                </p:cTn>
+                              </p:par>
+                              <p:par>
+                                <p:cTn id="13" presetID="1" presetClass="entr" presetSubtype="0" fill="hold" nodeType="withEffect">
                                   <p:stCondLst>
                                     <p:cond delay="0"/>
                                   </p:stCondLst>
@@ -19323,7 +19865,7 @@
                                           </p:stCondLst>
                                         </p:cTn>
                                         <p:tgtEl>
-                                          <p:spTgt spid="13"/>
+                                          <p:spTgt spid="3076"/>
                                         </p:tgtEl>
                                         <p:attrNameLst>
                                           <p:attrName>style.visibility</p:attrName>
@@ -19369,6 +19911,105 @@
                                         </p:cTn>
                                         <p:tgtEl>
                                           <p:spTgt spid="14"/>
+                                        </p:tgtEl>
+                                        <p:attrNameLst>
+                                          <p:attrName>style.visibility</p:attrName>
+                                        </p:attrNameLst>
+                                      </p:cBhvr>
+                                      <p:to>
+                                        <p:strVal val="visible"/>
+                                      </p:to>
+                                    </p:set>
+                                  </p:childTnLst>
+                                </p:cTn>
+                              </p:par>
+                              <p:par>
+                                <p:cTn id="19" presetID="1" presetClass="entr" presetSubtype="0" fill="hold" nodeType="withEffect">
+                                  <p:stCondLst>
+                                    <p:cond delay="0"/>
+                                  </p:stCondLst>
+                                  <p:childTnLst>
+                                    <p:set>
+                                      <p:cBhvr>
+                                        <p:cTn id="20" dur="1" fill="hold">
+                                          <p:stCondLst>
+                                            <p:cond delay="0"/>
+                                          </p:stCondLst>
+                                        </p:cTn>
+                                        <p:tgtEl>
+                                          <p:spTgt spid="3"/>
+                                        </p:tgtEl>
+                                        <p:attrNameLst>
+                                          <p:attrName>style.visibility</p:attrName>
+                                        </p:attrNameLst>
+                                      </p:cBhvr>
+                                      <p:to>
+                                        <p:strVal val="visible"/>
+                                      </p:to>
+                                    </p:set>
+                                  </p:childTnLst>
+                                </p:cTn>
+                              </p:par>
+                            </p:childTnLst>
+                          </p:cTn>
+                        </p:par>
+                      </p:childTnLst>
+                    </p:cTn>
+                  </p:par>
+                  <p:par>
+                    <p:cTn id="21" fill="hold">
+                      <p:stCondLst>
+                        <p:cond delay="indefinite"/>
+                      </p:stCondLst>
+                      <p:childTnLst>
+                        <p:par>
+                          <p:cTn id="22" fill="hold">
+                            <p:stCondLst>
+                              <p:cond delay="0"/>
+                            </p:stCondLst>
+                            <p:childTnLst>
+                              <p:par>
+                                <p:cTn id="23" presetID="1" presetClass="entr" presetSubtype="0" fill="hold" grpId="0" nodeType="clickEffect">
+                                  <p:stCondLst>
+                                    <p:cond delay="0"/>
+                                  </p:stCondLst>
+                                  <p:childTnLst>
+                                    <p:set>
+                                      <p:cBhvr>
+                                        <p:cTn id="24" dur="1" fill="hold">
+                                          <p:stCondLst>
+                                            <p:cond delay="0"/>
+                                          </p:stCondLst>
+                                        </p:cTn>
+                                        <p:tgtEl>
+                                          <p:spTgt spid="13"/>
+                                        </p:tgtEl>
+                                        <p:attrNameLst>
+                                          <p:attrName>style.visibility</p:attrName>
+                                        </p:attrNameLst>
+                                      </p:cBhvr>
+                                      <p:to>
+                                        <p:strVal val="visible"/>
+                                      </p:to>
+                                    </p:set>
+                                  </p:childTnLst>
+                                </p:cTn>
+                              </p:par>
+                              <p:par>
+                                <p:cTn id="25" presetID="1" presetClass="entr" presetSubtype="0" fill="hold" nodeType="withEffect">
+                                  <p:stCondLst>
+                                    <p:cond delay="0"/>
+                                  </p:stCondLst>
+                                  <p:childTnLst>
+                                    <p:set>
+                                      <p:cBhvr>
+                                        <p:cTn id="26" dur="1" fill="hold">
+                                          <p:stCondLst>
+                                            <p:cond delay="0"/>
+                                          </p:stCondLst>
+                                        </p:cTn>
+                                        <p:tgtEl>
+                                          <p:spTgt spid="3078"/>
                                         </p:tgtEl>
                                         <p:attrNameLst>
                                           <p:attrName>style.visibility</p:attrName>
@@ -20544,72 +21185,54 @@
           </a:p>
         </p:txBody>
       </p:sp>
-      <p:sp>
-        <p:nvSpPr>
-          <p:cNvPr id="2" name="TextBox 1">
-            <a:extLst>
-              <a:ext uri="{FF2B5EF4-FFF2-40B4-BE49-F238E27FC236}">
-                <a16:creationId xmlns:a16="http://schemas.microsoft.com/office/drawing/2014/main" id="{4071BCC3-06A4-EF48-B919-2EA04C6A18D3}"/>
-              </a:ext>
-            </a:extLst>
-          </p:cNvPr>
-          <p:cNvSpPr txBox="1"/>
+      <p:pic>
+        <p:nvPicPr>
+          <p:cNvPr id="1038" name="Picture 14" descr="https://m.media-amazon.com/images/I/61QvkhrnWML._AC_SL1411_.jpg"/>
+          <p:cNvPicPr>
+            <a:picLocks noChangeAspect="1" noChangeArrowheads="1"/>
+          </p:cNvPicPr>
           <p:nvPr/>
-        </p:nvSpPr>
-        <p:spPr>
+        </p:nvPicPr>
+        <p:blipFill>
+          <a:blip r:embed="rId2">
+            <a:extLst>
+              <a:ext uri="{28A0092B-C50C-407E-A947-70E740481C1C}">
+                <a14:useLocalDpi xmlns:a14="http://schemas.microsoft.com/office/drawing/2010/main" val="0"/>
+              </a:ext>
+            </a:extLst>
+          </a:blip>
+          <a:srcRect/>
+          <a:stretch>
+            <a:fillRect/>
+          </a:stretch>
+        </p:blipFill>
+        <p:spPr bwMode="auto">
           <a:xfrm>
-            <a:off x="3335438" y="2153175"/>
-            <a:ext cx="5521124" cy="1538471"/>
+            <a:off x="3827756" y="788622"/>
+            <a:ext cx="4536488" cy="3774513"/>
           </a:xfrm>
           <a:prstGeom prst="rect">
             <a:avLst/>
           </a:prstGeom>
-          <a:ln/>
+          <a:noFill/>
+          <a:effectLst>
+            <a:outerShdw blurRad="292100" dist="139700" dir="2700000" algn="tl" rotWithShape="0">
+              <a:prstClr val="black">
+                <a:alpha val="75000"/>
+              </a:prstClr>
+            </a:outerShdw>
+          </a:effectLst>
+          <a:extLst>
+            <a:ext uri="{909E8E84-426E-40DD-AFC4-6F175D3DCCD1}">
+              <a14:hiddenFill xmlns:a14="http://schemas.microsoft.com/office/drawing/2010/main">
+                <a:solidFill>
+                  <a:srgbClr val="FFFFFF"/>
+                </a:solidFill>
+              </a14:hiddenFill>
+            </a:ext>
+          </a:extLst>
         </p:spPr>
-        <p:style>
-          <a:lnRef idx="2">
-            <a:schemeClr val="accent2"/>
-          </a:lnRef>
-          <a:fillRef idx="1">
-            <a:schemeClr val="lt1"/>
-          </a:fillRef>
-          <a:effectRef idx="0">
-            <a:schemeClr val="accent2"/>
-          </a:effectRef>
-          <a:fontRef idx="minor">
-            <a:schemeClr val="dk1"/>
-          </a:fontRef>
-        </p:style>
-        <p:txBody>
-          <a:bodyPr vert="horz" wrap="square" lIns="144000" tIns="108000" rIns="144000" bIns="108000" rtlCol="0">
-            <a:spAutoFit/>
-          </a:bodyPr>
-          <a:lstStyle/>
-          <a:p>
-            <a:pPr algn="l" eaLnBrk="0" hangingPunct="0">
-              <a:lnSpc>
-                <a:spcPct val="110000"/>
-              </a:lnSpc>
-              <a:buClr>
-                <a:schemeClr val="accent5">
-                  <a:lumMod val="40000"/>
-                  <a:lumOff val="60000"/>
-                </a:schemeClr>
-              </a:buClr>
-              <a:buSzPct val="70000"/>
-            </a:pPr>
-            <a:r>
-              <a:rPr lang="en-BG" sz="4000" dirty="0"/>
-              <a:t>TODO:</a:t>
-            </a:r>
-            <a:r>
-              <a:rPr lang="bg-BG" sz="4000" dirty="0"/>
-              <a:t> Да се добави изображение</a:t>
-            </a:r>
-            <a:endParaRPr lang="en-BG" sz="4000" dirty="0"/>
-          </a:p>
-        </p:txBody>
-      </p:sp>
+      </p:pic>
     </p:spTree>
     <p:extLst>
       <p:ext uri="{BB962C8B-B14F-4D97-AF65-F5344CB8AC3E}">
@@ -20628,6 +21251,13 @@
       <p:transition spd="slow" advClick="0" advTm="5000"/>
     </mc:Fallback>
   </mc:AlternateContent>
+  <p:timing>
+    <p:tnLst>
+      <p:par>
+        <p:cTn id="1" dur="indefinite" restart="never" nodeType="tmRoot"/>
+      </p:par>
+    </p:tnLst>
+  </p:timing>
 </p:sld>
 </file>
 

</xml_diff>

<commit_message>
Fixes and TODOs for data storages slides
</commit_message>
<xml_diff>
--- a/Courses/Computer-Modeling-and-IT/Computer-Modeling-and-IT-5-Class/03-Data-Storages/03-Data-Storages.pptx
+++ b/Courses/Computer-Modeling-and-IT/Computer-Modeling-and-IT-5-Class/03-Data-Storages/03-Data-Storages.pptx
@@ -308,7 +308,7 @@
           <a:p>
             <a:fld id="{4E087215-0C8F-4762-A664-737A353EC9A4}" type="datetimeFigureOut">
               <a:rPr lang="bg-BG" smtClean="0"/>
-              <a:t>27.7.2023 г.</a:t>
+              <a:t>3.08.23 г.</a:t>
             </a:fld>
             <a:endParaRPr lang="bg-BG"/>
           </a:p>
@@ -485,7 +485,7 @@
           <a:p>
             <a:fld id="{72D84649-876A-46C9-8472-14CB09C070D8}" type="datetimeFigureOut">
               <a:rPr lang="en-US" smtClean="0"/>
-              <a:t>7/27/2023</a:t>
+              <a:t>8/3/23</a:t>
             </a:fld>
             <a:endParaRPr lang="en-US"/>
           </a:p>
@@ -3259,7 +3259,7 @@
             <a:fld id="{055373AC-9AA7-423B-BA00-BA1C74164DBD}" type="datetime1">
               <a:rPr lang="en-US" smtClean="0"/>
               <a:pPr/>
-              <a:t>7/27/2023</a:t>
+              <a:t>8/3/23</a:t>
             </a:fld>
             <a:endParaRPr lang="en-US" dirty="0"/>
           </a:p>
@@ -3938,7 +3938,7 @@
             <a:fld id="{055373AC-9AA7-423B-BA00-BA1C74164DBD}" type="datetime1">
               <a:rPr lang="en-US" smtClean="0"/>
               <a:pPr/>
-              <a:t>7/27/2023</a:t>
+              <a:t>8/3/23</a:t>
             </a:fld>
             <a:endParaRPr lang="en-US" dirty="0"/>
           </a:p>
@@ -4697,7 +4697,7 @@
             <a:fld id="{055373AC-9AA7-423B-BA00-BA1C74164DBD}" type="datetime1">
               <a:rPr lang="en-US" smtClean="0"/>
               <a:pPr/>
-              <a:t>7/27/2023</a:t>
+              <a:t>8/3/23</a:t>
             </a:fld>
             <a:endParaRPr lang="en-US" dirty="0"/>
           </a:p>
@@ -5192,7 +5192,7 @@
             <a:fld id="{055373AC-9AA7-423B-BA00-BA1C74164DBD}" type="datetime1">
               <a:rPr lang="en-US" smtClean="0"/>
               <a:pPr/>
-              <a:t>7/27/2023</a:t>
+              <a:t>8/3/23</a:t>
             </a:fld>
             <a:endParaRPr lang="en-US" dirty="0"/>
           </a:p>
@@ -7302,7 +7302,7 @@
             <a:fld id="{055373AC-9AA7-423B-BA00-BA1C74164DBD}" type="datetime1">
               <a:rPr lang="en-US" smtClean="0"/>
               <a:pPr/>
-              <a:t>7/27/2023</a:t>
+              <a:t>8/3/23</a:t>
             </a:fld>
             <a:endParaRPr lang="en-US" dirty="0"/>
           </a:p>
@@ -8641,7 +8641,7 @@
             <a:fld id="{055373AC-9AA7-423B-BA00-BA1C74164DBD}" type="datetime1">
               <a:rPr lang="en-US" smtClean="0"/>
               <a:pPr/>
-              <a:t>7/27/2023</a:t>
+              <a:t>8/3/23</a:t>
             </a:fld>
             <a:endParaRPr lang="en-US" dirty="0"/>
           </a:p>
@@ -9721,7 +9721,7 @@
             <a:fld id="{055373AC-9AA7-423B-BA00-BA1C74164DBD}" type="datetime1">
               <a:rPr lang="en-US" smtClean="0"/>
               <a:pPr/>
-              <a:t>7/27/2023</a:t>
+              <a:t>8/3/23</a:t>
             </a:fld>
             <a:endParaRPr lang="en-US" dirty="0"/>
           </a:p>
@@ -10133,7 +10133,7 @@
             <a:fld id="{055373AC-9AA7-423B-BA00-BA1C74164DBD}" type="datetime1">
               <a:rPr lang="en-US" smtClean="0"/>
               <a:pPr/>
-              <a:t>7/27/2023</a:t>
+              <a:t>8/3/23</a:t>
             </a:fld>
             <a:endParaRPr lang="en-US" dirty="0"/>
           </a:p>
@@ -10503,7 +10503,7 @@
             <a:fld id="{055373AC-9AA7-423B-BA00-BA1C74164DBD}" type="datetime1">
               <a:rPr lang="en-US" smtClean="0"/>
               <a:pPr/>
-              <a:t>7/27/2023</a:t>
+              <a:t>8/3/23</a:t>
             </a:fld>
             <a:endParaRPr lang="en-US" dirty="0"/>
           </a:p>
@@ -11171,7 +11171,7 @@
             <a:fld id="{055373AC-9AA7-423B-BA00-BA1C74164DBD}" type="datetime1">
               <a:rPr lang="en-US" smtClean="0"/>
               <a:pPr/>
-              <a:t>7/27/2023</a:t>
+              <a:t>8/3/23</a:t>
             </a:fld>
             <a:endParaRPr lang="en-US" dirty="0"/>
           </a:p>
@@ -11379,7 +11379,7 @@
             <a:fld id="{055373AC-9AA7-423B-BA00-BA1C74164DBD}" type="datetime1">
               <a:rPr lang="en-US" smtClean="0"/>
               <a:pPr/>
-              <a:t>7/27/2023</a:t>
+              <a:t>8/3/23</a:t>
             </a:fld>
             <a:endParaRPr lang="en-US" dirty="0"/>
           </a:p>
@@ -12185,13 +12185,6 @@
       <p:transition spd="slow" advClick="0" advTm="5000"/>
     </mc:Fallback>
   </mc:AlternateContent>
-  <p:timing>
-    <p:tnLst>
-      <p:par>
-        <p:cTn id="1" dur="indefinite" restart="never" nodeType="tmRoot"/>
-      </p:par>
-    </p:tnLst>
-  </p:timing>
 </p:sld>
 </file>
 
@@ -12214,6 +12207,90 @@
       </p:grpSpPr>
       <p:sp>
         <p:nvSpPr>
+          <p:cNvPr id="3" name="Текстов контейнер 2"/>
+          <p:cNvSpPr>
+            <a:spLocks noGrp="1"/>
+          </p:cNvSpPr>
+          <p:nvPr>
+            <p:ph type="body" sz="quarter" idx="10"/>
+          </p:nvPr>
+        </p:nvSpPr>
+        <p:spPr/>
+        <p:txBody>
+          <a:bodyPr>
+            <a:normAutofit/>
+          </a:bodyPr>
+          <a:lstStyle/>
+          <a:p>
+            <a:r>
+              <a:rPr lang="bg-BG" sz="3600" dirty="0"/>
+              <a:t>Всеки носител на информация се управлява от </a:t>
+            </a:r>
+            <a:r>
+              <a:rPr lang="bg-BG" sz="3600" b="1" dirty="0">
+                <a:solidFill>
+                  <a:schemeClr val="bg1"/>
+                </a:solidFill>
+              </a:rPr>
+              <a:t>устройство за достъп</a:t>
+            </a:r>
+            <a:r>
+              <a:rPr lang="bg-BG" sz="3600" b="1" dirty="0"/>
+              <a:t> </a:t>
+            </a:r>
+            <a:r>
+              <a:rPr lang="bg-BG" sz="3600" dirty="0"/>
+              <a:t>до информацията в него</a:t>
+            </a:r>
+          </a:p>
+          <a:p>
+            <a:r>
+              <a:rPr lang="bg-BG" sz="3600" dirty="0"/>
+              <a:t>Всяко устройство има:</a:t>
+            </a:r>
+          </a:p>
+          <a:p>
+            <a:pPr lvl="1">
+              <a:buClr>
+                <a:schemeClr val="tx1"/>
+              </a:buClr>
+            </a:pPr>
+            <a:r>
+              <a:rPr lang="bg-BG" sz="3400" b="1" dirty="0">
+                <a:solidFill>
+                  <a:schemeClr val="bg1"/>
+                </a:solidFill>
+              </a:rPr>
+              <a:t>Физическо</a:t>
+            </a:r>
+            <a:r>
+              <a:rPr lang="bg-BG" sz="3400" dirty="0"/>
+              <a:t> име</a:t>
+            </a:r>
+          </a:p>
+          <a:p>
+            <a:pPr lvl="1">
+              <a:buClr>
+                <a:schemeClr val="tx1"/>
+              </a:buClr>
+            </a:pPr>
+            <a:r>
+              <a:rPr lang="bg-BG" sz="3400" b="1" dirty="0">
+                <a:solidFill>
+                  <a:schemeClr val="bg1"/>
+                </a:solidFill>
+              </a:rPr>
+              <a:t>Логическо</a:t>
+            </a:r>
+            <a:r>
+              <a:rPr lang="bg-BG" sz="3400" dirty="0"/>
+              <a:t> име</a:t>
+            </a:r>
+          </a:p>
+        </p:txBody>
+      </p:sp>
+      <p:sp>
+        <p:nvSpPr>
           <p:cNvPr id="5" name="Title 4">
             <a:extLst>
               <a:ext uri="{FF2B5EF4-FFF2-40B4-BE49-F238E27FC236}">
@@ -12228,12 +12305,7 @@
             <p:ph type="title"/>
           </p:nvPr>
         </p:nvSpPr>
-        <p:spPr>
-          <a:xfrm>
-            <a:off x="1296957" y="100750"/>
-            <a:ext cx="8789578" cy="882654"/>
-          </a:xfrm>
-        </p:spPr>
+        <p:spPr/>
         <p:txBody>
           <a:bodyPr>
             <a:normAutofit/>
@@ -12243,99 +12315,6 @@
             <a:r>
               <a:rPr lang="bg-BG" sz="4000" dirty="0"/>
               <a:t>Устройства за достъп до НИ (1)</a:t>
-            </a:r>
-          </a:p>
-        </p:txBody>
-      </p:sp>
-      <p:sp>
-        <p:nvSpPr>
-          <p:cNvPr id="3" name="Текстов контейнер 2"/>
-          <p:cNvSpPr>
-            <a:spLocks noGrp="1"/>
-          </p:cNvSpPr>
-          <p:nvPr>
-            <p:ph type="body" sz="quarter" idx="10"/>
-          </p:nvPr>
-        </p:nvSpPr>
-        <p:spPr>
-          <a:xfrm>
-            <a:off x="1959071" y="1146585"/>
-            <a:ext cx="10036163" cy="3973370"/>
-          </a:xfrm>
-        </p:spPr>
-        <p:txBody>
-          <a:bodyPr>
-            <a:normAutofit/>
-          </a:bodyPr>
-          <a:lstStyle/>
-          <a:p>
-            <a:r>
-              <a:rPr lang="bg-BG" sz="3600" dirty="0"/>
-              <a:t>Всеки носител на информация се управлява от </a:t>
-            </a:r>
-            <a:r>
-              <a:rPr lang="bg-BG" sz="3600" b="1" dirty="0">
-                <a:solidFill>
-                  <a:schemeClr val="bg1"/>
-                </a:solidFill>
-              </a:rPr>
-              <a:t>устройство за достъп</a:t>
-            </a:r>
-            <a:r>
-              <a:rPr lang="bg-BG" sz="3600" b="1" dirty="0"/>
-              <a:t> </a:t>
-            </a:r>
-            <a:r>
-              <a:rPr lang="bg-BG" sz="3600" dirty="0"/>
-              <a:t>до информацията в него</a:t>
-            </a:r>
-          </a:p>
-          <a:p>
-            <a:r>
-              <a:rPr lang="bg-BG" sz="3600" dirty="0"/>
-              <a:t>Всяко устройство има:</a:t>
-            </a:r>
-          </a:p>
-          <a:p>
-            <a:pPr lvl="1">
-              <a:buClr>
-                <a:schemeClr val="tx1"/>
-              </a:buClr>
-            </a:pPr>
-            <a:r>
-              <a:rPr lang="bg-BG" sz="3400" b="1" dirty="0">
-                <a:solidFill>
-                  <a:schemeClr val="bg1"/>
-                </a:solidFill>
-              </a:rPr>
-              <a:t>Физическо</a:t>
-            </a:r>
-            <a:r>
-              <a:rPr lang="bg-BG" sz="3400" dirty="0"/>
-              <a:t> име</a:t>
-            </a:r>
-          </a:p>
-          <a:p>
-            <a:pPr lvl="1">
-              <a:buClr>
-                <a:schemeClr val="tx1"/>
-              </a:buClr>
-            </a:pPr>
-            <a:r>
-              <a:rPr lang="bg-BG" sz="3400" b="1" dirty="0">
-                <a:solidFill>
-                  <a:schemeClr val="bg1"/>
-                </a:solidFill>
-              </a:rPr>
-              <a:t>Логическо</a:t>
-            </a:r>
-            <a:r>
-              <a:rPr lang="bg-BG" sz="3400" dirty="0"/>
-              <a:t> </a:t>
-            </a:r>
-            <a:r>
-              <a:rPr lang="bg-BG" sz="3400" dirty="0" smtClean="0"/>
-              <a:t>име</a:t>
             </a:r>
           </a:p>
         </p:txBody>
@@ -12367,6 +12346,75 @@
               <a:t>10</a:t>
             </a:fld>
             <a:endParaRPr lang="en-US" dirty="0"/>
+          </a:p>
+        </p:txBody>
+      </p:sp>
+      <p:sp>
+        <p:nvSpPr>
+          <p:cNvPr id="2" name="TextBox 1">
+            <a:extLst>
+              <a:ext uri="{FF2B5EF4-FFF2-40B4-BE49-F238E27FC236}">
+                <a16:creationId xmlns:a16="http://schemas.microsoft.com/office/drawing/2014/main" id="{6DF0FF68-2975-C13B-9BE6-30CD9D0E5B7D}"/>
+              </a:ext>
+            </a:extLst>
+          </p:cNvPr>
+          <p:cNvSpPr txBox="1"/>
+          <p:nvPr/>
+        </p:nvSpPr>
+        <p:spPr>
+          <a:xfrm>
+            <a:off x="6823880" y="3725839"/>
+            <a:ext cx="4353635" cy="2015846"/>
+          </a:xfrm>
+          <a:prstGeom prst="rect">
+            <a:avLst/>
+          </a:prstGeom>
+          <a:ln/>
+        </p:spPr>
+        <p:style>
+          <a:lnRef idx="2">
+            <a:schemeClr val="accent2"/>
+          </a:lnRef>
+          <a:fillRef idx="1">
+            <a:schemeClr val="lt1"/>
+          </a:fillRef>
+          <a:effectRef idx="0">
+            <a:schemeClr val="accent2"/>
+          </a:effectRef>
+          <a:fontRef idx="minor">
+            <a:schemeClr val="dk1"/>
+          </a:fontRef>
+        </p:style>
+        <p:txBody>
+          <a:bodyPr vert="horz" wrap="square" lIns="144000" tIns="108000" rIns="144000" bIns="108000" rtlCol="0">
+            <a:spAutoFit/>
+          </a:bodyPr>
+          <a:lstStyle/>
+          <a:p>
+            <a:pPr algn="l" eaLnBrk="0" hangingPunct="0">
+              <a:lnSpc>
+                <a:spcPct val="110000"/>
+              </a:lnSpc>
+              <a:buClr>
+                <a:schemeClr val="accent5">
+                  <a:lumMod val="40000"/>
+                  <a:lumOff val="60000"/>
+                </a:schemeClr>
+              </a:buClr>
+              <a:buSzPct val="70000"/>
+            </a:pPr>
+            <a:r>
+              <a:rPr lang="en-BG" sz="3600" dirty="0"/>
+              <a:t>TODO: add more content (anothe</a:t>
+            </a:r>
+            <a:r>
+              <a:rPr lang="en-GB" sz="3600" dirty="0"/>
+              <a:t>r</a:t>
+            </a:r>
+            <a:r>
+              <a:rPr lang="en-BG" sz="3600" dirty="0"/>
+              <a:t> bullet or image)</a:t>
+            </a:r>
           </a:p>
         </p:txBody>
       </p:sp>
@@ -13129,7 +13177,257 @@
   <p:timing>
     <p:tnLst>
       <p:par>
-        <p:cTn id="1" dur="indefinite" restart="never" nodeType="tmRoot"/>
+        <p:cTn id="1" dur="indefinite" restart="never" nodeType="tmRoot">
+          <p:childTnLst>
+            <p:seq concurrent="1" nextAc="seek">
+              <p:cTn id="2" dur="indefinite" nodeType="mainSeq">
+                <p:childTnLst>
+                  <p:par>
+                    <p:cTn id="3" fill="hold">
+                      <p:stCondLst>
+                        <p:cond delay="indefinite"/>
+                      </p:stCondLst>
+                      <p:childTnLst>
+                        <p:par>
+                          <p:cTn id="4" fill="hold">
+                            <p:stCondLst>
+                              <p:cond delay="0"/>
+                            </p:stCondLst>
+                            <p:childTnLst>
+                              <p:par>
+                                <p:cTn id="5" presetID="1" presetClass="entr" presetSubtype="0" fill="hold" nodeType="clickEffect">
+                                  <p:stCondLst>
+                                    <p:cond delay="0"/>
+                                  </p:stCondLst>
+                                  <p:childTnLst>
+                                    <p:set>
+                                      <p:cBhvr>
+                                        <p:cTn id="6" dur="1" fill="hold">
+                                          <p:stCondLst>
+                                            <p:cond delay="0"/>
+                                          </p:stCondLst>
+                                        </p:cTn>
+                                        <p:tgtEl>
+                                          <p:spTgt spid="3">
+                                            <p:txEl>
+                                              <p:pRg st="1" end="1"/>
+                                            </p:txEl>
+                                          </p:spTgt>
+                                        </p:tgtEl>
+                                        <p:attrNameLst>
+                                          <p:attrName>style.visibility</p:attrName>
+                                        </p:attrNameLst>
+                                      </p:cBhvr>
+                                      <p:to>
+                                        <p:strVal val="visible"/>
+                                      </p:to>
+                                    </p:set>
+                                  </p:childTnLst>
+                                </p:cTn>
+                              </p:par>
+                              <p:par>
+                                <p:cTn id="7" presetID="1" presetClass="entr" presetSubtype="0" fill="hold" nodeType="withEffect">
+                                  <p:stCondLst>
+                                    <p:cond delay="0"/>
+                                  </p:stCondLst>
+                                  <p:childTnLst>
+                                    <p:set>
+                                      <p:cBhvr>
+                                        <p:cTn id="8" dur="1" fill="hold">
+                                          <p:stCondLst>
+                                            <p:cond delay="0"/>
+                                          </p:stCondLst>
+                                        </p:cTn>
+                                        <p:tgtEl>
+                                          <p:spTgt spid="3">
+                                            <p:txEl>
+                                              <p:pRg st="2" end="2"/>
+                                            </p:txEl>
+                                          </p:spTgt>
+                                        </p:tgtEl>
+                                        <p:attrNameLst>
+                                          <p:attrName>style.visibility</p:attrName>
+                                        </p:attrNameLst>
+                                      </p:cBhvr>
+                                      <p:to>
+                                        <p:strVal val="visible"/>
+                                      </p:to>
+                                    </p:set>
+                                  </p:childTnLst>
+                                </p:cTn>
+                              </p:par>
+                            </p:childTnLst>
+                          </p:cTn>
+                        </p:par>
+                      </p:childTnLst>
+                    </p:cTn>
+                  </p:par>
+                  <p:par>
+                    <p:cTn id="9" fill="hold">
+                      <p:stCondLst>
+                        <p:cond delay="indefinite"/>
+                      </p:stCondLst>
+                      <p:childTnLst>
+                        <p:par>
+                          <p:cTn id="10" fill="hold">
+                            <p:stCondLst>
+                              <p:cond delay="0"/>
+                            </p:stCondLst>
+                            <p:childTnLst>
+                              <p:par>
+                                <p:cTn id="11" presetID="1" presetClass="entr" presetSubtype="0" fill="hold" nodeType="clickEffect">
+                                  <p:stCondLst>
+                                    <p:cond delay="0"/>
+                                  </p:stCondLst>
+                                  <p:childTnLst>
+                                    <p:set>
+                                      <p:cBhvr>
+                                        <p:cTn id="12" dur="1" fill="hold">
+                                          <p:stCondLst>
+                                            <p:cond delay="0"/>
+                                          </p:stCondLst>
+                                        </p:cTn>
+                                        <p:tgtEl>
+                                          <p:spTgt spid="3">
+                                            <p:txEl>
+                                              <p:pRg st="3" end="3"/>
+                                            </p:txEl>
+                                          </p:spTgt>
+                                        </p:tgtEl>
+                                        <p:attrNameLst>
+                                          <p:attrName>style.visibility</p:attrName>
+                                        </p:attrNameLst>
+                                      </p:cBhvr>
+                                      <p:to>
+                                        <p:strVal val="visible"/>
+                                      </p:to>
+                                    </p:set>
+                                  </p:childTnLst>
+                                </p:cTn>
+                              </p:par>
+                            </p:childTnLst>
+                          </p:cTn>
+                        </p:par>
+                      </p:childTnLst>
+                    </p:cTn>
+                  </p:par>
+                  <p:par>
+                    <p:cTn id="13" fill="hold">
+                      <p:stCondLst>
+                        <p:cond delay="indefinite"/>
+                      </p:stCondLst>
+                      <p:childTnLst>
+                        <p:par>
+                          <p:cTn id="14" fill="hold">
+                            <p:stCondLst>
+                              <p:cond delay="0"/>
+                            </p:stCondLst>
+                            <p:childTnLst>
+                              <p:par>
+                                <p:cTn id="15" presetID="1" presetClass="entr" presetSubtype="0" fill="hold" nodeType="clickEffect">
+                                  <p:stCondLst>
+                                    <p:cond delay="0"/>
+                                  </p:stCondLst>
+                                  <p:childTnLst>
+                                    <p:set>
+                                      <p:cBhvr>
+                                        <p:cTn id="16" dur="1" fill="hold">
+                                          <p:stCondLst>
+                                            <p:cond delay="0"/>
+                                          </p:stCondLst>
+                                        </p:cTn>
+                                        <p:tgtEl>
+                                          <p:spTgt spid="3">
+                                            <p:txEl>
+                                              <p:pRg st="4" end="4"/>
+                                            </p:txEl>
+                                          </p:spTgt>
+                                        </p:tgtEl>
+                                        <p:attrNameLst>
+                                          <p:attrName>style.visibility</p:attrName>
+                                        </p:attrNameLst>
+                                      </p:cBhvr>
+                                      <p:to>
+                                        <p:strVal val="visible"/>
+                                      </p:to>
+                                    </p:set>
+                                  </p:childTnLst>
+                                </p:cTn>
+                              </p:par>
+                            </p:childTnLst>
+                          </p:cTn>
+                        </p:par>
+                      </p:childTnLst>
+                    </p:cTn>
+                  </p:par>
+                  <p:par>
+                    <p:cTn id="17" fill="hold">
+                      <p:stCondLst>
+                        <p:cond delay="indefinite"/>
+                      </p:stCondLst>
+                      <p:childTnLst>
+                        <p:par>
+                          <p:cTn id="18" fill="hold">
+                            <p:stCondLst>
+                              <p:cond delay="0"/>
+                            </p:stCondLst>
+                            <p:childTnLst>
+                              <p:par>
+                                <p:cTn id="19" presetID="1" presetClass="entr" presetSubtype="0" fill="hold" nodeType="clickEffect">
+                                  <p:stCondLst>
+                                    <p:cond delay="0"/>
+                                  </p:stCondLst>
+                                  <p:childTnLst>
+                                    <p:set>
+                                      <p:cBhvr>
+                                        <p:cTn id="20" dur="1" fill="hold">
+                                          <p:stCondLst>
+                                            <p:cond delay="0"/>
+                                          </p:stCondLst>
+                                        </p:cTn>
+                                        <p:tgtEl>
+                                          <p:spTgt spid="3">
+                                            <p:txEl>
+                                              <p:pRg st="5" end="5"/>
+                                            </p:txEl>
+                                          </p:spTgt>
+                                        </p:tgtEl>
+                                        <p:attrNameLst>
+                                          <p:attrName>style.visibility</p:attrName>
+                                        </p:attrNameLst>
+                                      </p:cBhvr>
+                                      <p:to>
+                                        <p:strVal val="visible"/>
+                                      </p:to>
+                                    </p:set>
+                                  </p:childTnLst>
+                                </p:cTn>
+                              </p:par>
+                            </p:childTnLst>
+                          </p:cTn>
+                        </p:par>
+                      </p:childTnLst>
+                    </p:cTn>
+                  </p:par>
+                </p:childTnLst>
+              </p:cTn>
+              <p:prevCondLst>
+                <p:cond evt="onPrev" delay="0">
+                  <p:tgtEl>
+                    <p:sldTgt/>
+                  </p:tgtEl>
+                </p:cond>
+              </p:prevCondLst>
+              <p:nextCondLst>
+                <p:cond evt="onNext" delay="0">
+                  <p:tgtEl>
+                    <p:sldTgt/>
+                  </p:tgtEl>
+                </p:cond>
+              </p:nextCondLst>
+            </p:seq>
+          </p:childTnLst>
+        </p:cTn>
       </p:par>
     </p:tnLst>
   </p:timing>
@@ -13165,8 +13463,8 @@
         </p:nvSpPr>
         <p:spPr>
           <a:xfrm>
-            <a:off x="373904" y="1504975"/>
-            <a:ext cx="11818096" cy="5201066"/>
+            <a:off x="121559" y="1350552"/>
+            <a:ext cx="11906665" cy="5201066"/>
           </a:xfrm>
         </p:spPr>
         <p:txBody>
@@ -13176,46 +13474,59 @@
           <a:lstStyle/>
           <a:p>
             <a:r>
-              <a:rPr lang="bg-BG" dirty="0"/>
+              <a:rPr lang="bg-BG" sz="3800" dirty="0"/>
               <a:t>Задава се от </a:t>
             </a:r>
             <a:r>
-              <a:rPr lang="bg-BG" dirty="0" smtClean="0"/>
+              <a:rPr lang="bg-BG" sz="3800" b="1" dirty="0">
+                <a:solidFill>
+                  <a:schemeClr val="bg1"/>
+                </a:solidFill>
+              </a:rPr>
               <a:t>ОС</a:t>
             </a:r>
           </a:p>
           <a:p>
             <a:r>
-              <a:rPr lang="bg-BG" dirty="0" smtClean="0"/>
-              <a:t>Един физически НИ може да е разделен на няколко логически дяла, като всеки дял си има логическо име</a:t>
-            </a:r>
-            <a:r>
-              <a:rPr lang="bg-BG" dirty="0" smtClean="0"/>
-              <a:t> </a:t>
-            </a:r>
-            <a:endParaRPr lang="bg-BG" dirty="0"/>
-          </a:p>
-          <a:p>
-            <a:r>
-              <a:rPr lang="bg-BG" dirty="0"/>
-              <a:t>Отнася се до управлението на информацията в папки и файлове</a:t>
-            </a:r>
-          </a:p>
-          <a:p>
-            <a:r>
-              <a:rPr lang="bg-BG" dirty="0"/>
-              <a:t>Не зависи от вида на </a:t>
-            </a:r>
-            <a:r>
-              <a:rPr lang="bg-BG" dirty="0" smtClean="0"/>
-              <a:t>устройството</a:t>
-            </a:r>
-          </a:p>
-          <a:p>
-            <a:pPr marL="609219" lvl="1" indent="0">
-              <a:buNone/>
-            </a:pPr>
-            <a:endParaRPr lang="bg-BG" dirty="0"/>
+              <a:rPr lang="bg-BG" sz="3800" dirty="0"/>
+              <a:t>Един физически НИ може да е разделен на </a:t>
+            </a:r>
+            <a:r>
+              <a:rPr lang="bg-BG" sz="3800" b="1" dirty="0">
+                <a:solidFill>
+                  <a:schemeClr val="bg1"/>
+                </a:solidFill>
+              </a:rPr>
+              <a:t>няколко логически дяла</a:t>
+            </a:r>
+            <a:r>
+              <a:rPr lang="bg-BG" sz="3800" dirty="0"/>
+              <a:t>, като всеки дял си има логическо име </a:t>
+            </a:r>
+          </a:p>
+          <a:p>
+            <a:r>
+              <a:rPr lang="bg-BG" sz="3800" dirty="0"/>
+              <a:t>Отнася се до </a:t>
+            </a:r>
+            <a:r>
+              <a:rPr lang="bg-BG" sz="3800" b="1" dirty="0">
+                <a:solidFill>
+                  <a:schemeClr val="bg1"/>
+                </a:solidFill>
+              </a:rPr>
+              <a:t>управлението на информацията </a:t>
+            </a:r>
+            <a:r>
+              <a:rPr lang="bg-BG" sz="3800" dirty="0"/>
+              <a:t>в папки и файлове</a:t>
+            </a:r>
+          </a:p>
+          <a:p>
+            <a:r>
+              <a:rPr lang="bg-BG" sz="3800" dirty="0"/>
+              <a:t>Не зависи от вида на устройството</a:t>
+            </a:r>
           </a:p>
         </p:txBody>
       </p:sp>
@@ -13333,7 +13644,7 @@
                                         <p:tgtEl>
                                           <p:spTgt spid="3">
                                             <p:txEl>
-                                              <p:pRg st="0" end="0"/>
+                                              <p:pRg st="1" end="1"/>
                                             </p:txEl>
                                           </p:spTgt>
                                         </p:tgtEl>
@@ -13382,7 +13693,7 @@
                                         <p:tgtEl>
                                           <p:spTgt spid="3">
                                             <p:txEl>
-                                              <p:pRg st="1" end="1"/>
+                                              <p:pRg st="2" end="2"/>
                                             </p:txEl>
                                           </p:spTgt>
                                         </p:tgtEl>
@@ -13424,55 +13735,6 @@
                                     <p:set>
                                       <p:cBhvr>
                                         <p:cTn id="14" dur="1" fill="hold">
-                                          <p:stCondLst>
-                                            <p:cond delay="0"/>
-                                          </p:stCondLst>
-                                        </p:cTn>
-                                        <p:tgtEl>
-                                          <p:spTgt spid="3">
-                                            <p:txEl>
-                                              <p:pRg st="2" end="2"/>
-                                            </p:txEl>
-                                          </p:spTgt>
-                                        </p:tgtEl>
-                                        <p:attrNameLst>
-                                          <p:attrName>style.visibility</p:attrName>
-                                        </p:attrNameLst>
-                                      </p:cBhvr>
-                                      <p:to>
-                                        <p:strVal val="visible"/>
-                                      </p:to>
-                                    </p:set>
-                                  </p:childTnLst>
-                                </p:cTn>
-                              </p:par>
-                            </p:childTnLst>
-                          </p:cTn>
-                        </p:par>
-                      </p:childTnLst>
-                    </p:cTn>
-                  </p:par>
-                  <p:par>
-                    <p:cTn id="15" fill="hold">
-                      <p:stCondLst>
-                        <p:cond delay="indefinite"/>
-                      </p:stCondLst>
-                      <p:childTnLst>
-                        <p:par>
-                          <p:cTn id="16" fill="hold">
-                            <p:stCondLst>
-                              <p:cond delay="0"/>
-                            </p:stCondLst>
-                            <p:childTnLst>
-                              <p:par>
-                                <p:cTn id="17" presetID="1" presetClass="entr" presetSubtype="0" fill="hold" grpId="0" nodeType="clickEffect">
-                                  <p:stCondLst>
-                                    <p:cond delay="0"/>
-                                  </p:stCondLst>
-                                  <p:childTnLst>
-                                    <p:set>
-                                      <p:cBhvr>
-                                        <p:cTn id="18" dur="1" fill="hold">
                                           <p:stCondLst>
                                             <p:cond delay="0"/>
                                           </p:stCondLst>
@@ -14511,13 +14773,6 @@
       <p:transition spd="slow" advClick="0" advTm="5000"/>
     </mc:Fallback>
   </mc:AlternateContent>
-  <p:timing>
-    <p:tnLst>
-      <p:par>
-        <p:cTn id="1" dur="indefinite" restart="never" nodeType="tmRoot"/>
-      </p:par>
-    </p:tnLst>
-  </p:timing>
 </p:sld>
 </file>
 
@@ -14551,12 +14806,12 @@
         <p:spPr>
           <a:xfrm>
             <a:off x="415484" y="1451820"/>
-            <a:ext cx="10416639" cy="3907970"/>
+            <a:ext cx="11579750" cy="3907970"/>
           </a:xfrm>
         </p:spPr>
         <p:txBody>
           <a:bodyPr>
-            <a:normAutofit fontScale="85000" lnSpcReduction="10000"/>
+            <a:normAutofit fontScale="92500" lnSpcReduction="10000"/>
           </a:bodyPr>
           <a:lstStyle/>
           <a:p>
@@ -14652,13 +14907,9 @@
             </a:r>
             <a:r>
               <a:rPr lang="bg-BG" sz="3600" dirty="0"/>
-              <a:t> в устройствата за </a:t>
-            </a:r>
-            <a:r>
-              <a:rPr lang="bg-BG" sz="3600" dirty="0" smtClean="0"/>
-              <a:t>четене/запис</a:t>
-            </a:r>
-            <a:endParaRPr lang="en-US" sz="3600" dirty="0" smtClean="0"/>
+              <a:t> в устройствата за четене/запис</a:t>
+            </a:r>
+            <a:endParaRPr lang="en-US" sz="3600" dirty="0"/>
           </a:p>
           <a:p>
             <a:pPr>
@@ -14670,7 +14921,7 @@
               </a:buClr>
             </a:pPr>
             <a:r>
-              <a:rPr lang="bg-BG" sz="3600" b="1" dirty="0" smtClean="0">
+              <a:rPr lang="bg-BG" sz="3600" b="1" dirty="0">
                 <a:solidFill>
                   <a:schemeClr val="bg1"/>
                 </a:solidFill>
@@ -14678,11 +14929,11 @@
               <a:t>Проверявайте</a:t>
             </a:r>
             <a:r>
-              <a:rPr lang="bg-BG" sz="3600" dirty="0" smtClean="0"/>
+              <a:rPr lang="bg-BG" sz="3600" dirty="0"/>
               <a:t> и </a:t>
             </a:r>
             <a:r>
-              <a:rPr lang="bg-BG" sz="3600" b="1" dirty="0" smtClean="0">
+              <a:rPr lang="bg-BG" sz="3600" b="1" dirty="0">
                 <a:solidFill>
                   <a:schemeClr val="bg1"/>
                 </a:solidFill>
@@ -14690,10 +14941,9 @@
               <a:t>поправяйте</a:t>
             </a:r>
             <a:r>
-              <a:rPr lang="bg-BG" sz="3600" dirty="0" smtClean="0"/>
+              <a:rPr lang="bg-BG" sz="3600" dirty="0"/>
               <a:t> НИ за грешки  в записаната информацията</a:t>
             </a:r>
-            <a:endParaRPr lang="bg-BG" sz="3600" dirty="0"/>
           </a:p>
         </p:txBody>
       </p:sp>
@@ -14773,8 +15023,8 @@
         </p:blipFill>
         <p:spPr>
           <a:xfrm>
-            <a:off x="6992446" y="4783914"/>
-            <a:ext cx="3670864" cy="1767704"/>
+            <a:off x="6817163" y="4729405"/>
+            <a:ext cx="4237528" cy="2040581"/>
           </a:xfrm>
           <a:prstGeom prst="rect">
             <a:avLst/>
@@ -15105,6 +15355,13 @@
           <a:prstGeom prst="rect">
             <a:avLst/>
           </a:prstGeom>
+          <a:ln>
+            <a:solidFill>
+              <a:schemeClr val="bg2">
+                <a:lumMod val="75000"/>
+              </a:schemeClr>
+            </a:solidFill>
+          </a:ln>
         </p:spPr>
       </p:pic>
       <p:pic>
@@ -15129,6 +15386,13 @@
           <a:prstGeom prst="rect">
             <a:avLst/>
           </a:prstGeom>
+          <a:ln>
+            <a:solidFill>
+              <a:schemeClr val="bg2">
+                <a:lumMod val="75000"/>
+              </a:schemeClr>
+            </a:solidFill>
+          </a:ln>
         </p:spPr>
       </p:pic>
       <p:sp>
@@ -15143,7 +15407,7 @@
         </p:nvSpPr>
         <p:spPr>
           <a:xfrm>
-            <a:off x="302944" y="1307078"/>
+            <a:off x="302944" y="1238838"/>
             <a:ext cx="7954791" cy="2112124"/>
           </a:xfrm>
         </p:spPr>
@@ -15159,12 +15423,8 @@
               </a:lnSpc>
             </a:pPr>
             <a:r>
-              <a:rPr lang="bg-BG" sz="3600" dirty="0" smtClean="0"/>
-              <a:t>Изваждайте </a:t>
-            </a:r>
-            <a:r>
               <a:rPr lang="bg-BG" sz="3600" dirty="0"/>
-              <a:t>премахваемите НИ с </a:t>
+              <a:t>Изваждайте премахваемите НИ с </a:t>
             </a:r>
             <a:r>
               <a:rPr lang="bg-BG" sz="3600" b="1" dirty="0">
@@ -15241,7 +15501,7 @@
           <a:p>
             <a:pPr algn="ctr"/>
             <a:r>
-              <a:rPr lang="bg-BG" sz="2800" b="1" dirty="0" smtClean="0">
+              <a:rPr lang="bg-BG" sz="2800" b="1" dirty="0">
                 <a:solidFill>
                   <a:srgbClr val="FFFFFF"/>
                 </a:solidFill>
@@ -15255,18 +15515,6 @@
               </a:rPr>
               <a:t>Изберете носителя</a:t>
             </a:r>
-            <a:endParaRPr lang="bg-BG" sz="2800" b="1" dirty="0">
-              <a:solidFill>
-                <a:srgbClr val="FFFFFF"/>
-              </a:solidFill>
-              <a:effectLst>
-                <a:outerShdw blurRad="38100" dist="38100" dir="2700000" algn="tl">
-                  <a:srgbClr val="000000">
-                    <a:alpha val="43137"/>
-                  </a:srgbClr>
-                </a:outerShdw>
-              </a:effectLst>
-            </a:endParaRPr>
           </a:p>
         </p:txBody>
       </p:sp>
@@ -15330,7 +15578,7 @@
           <a:p>
             <a:pPr algn="ctr"/>
             <a:r>
-              <a:rPr lang="bg-BG" sz="2800" b="1" dirty="0" smtClean="0">
+              <a:rPr lang="bg-BG" sz="2800" b="1" dirty="0">
                 <a:solidFill>
                   <a:srgbClr val="FFFFFF"/>
                 </a:solidFill>
@@ -15345,9 +15593,12 @@
               <a:t>От </a:t>
             </a:r>
             <a:r>
-              <a:rPr lang="bg-BG" sz="2800" b="1" dirty="0" smtClean="0">
+              <a:rPr lang="bg-BG" sz="2800" b="1" dirty="0">
                 <a:solidFill>
-                  <a:schemeClr val="bg1"/>
+                  <a:schemeClr val="bg1">
+                    <a:lumMod val="60000"/>
+                    <a:lumOff val="40000"/>
+                  </a:schemeClr>
                 </a:solidFill>
                 <a:effectLst>
                   <a:outerShdw blurRad="38100" dist="38100" dir="2700000" algn="tl">
@@ -15360,7 +15611,7 @@
               <a:t>контекстното</a:t>
             </a:r>
             <a:r>
-              <a:rPr lang="bg-BG" sz="2800" b="1" dirty="0" smtClean="0">
+              <a:rPr lang="bg-BG" sz="2800" b="1" dirty="0">
                 <a:solidFill>
                   <a:srgbClr val="FFFFFF"/>
                 </a:solidFill>
@@ -15375,9 +15626,12 @@
               <a:t> меню изберете </a:t>
             </a:r>
             <a:r>
-              <a:rPr lang="bg-BG" sz="2800" b="1" dirty="0" smtClean="0">
+              <a:rPr lang="bg-BG" sz="2800" b="1" dirty="0">
                 <a:solidFill>
-                  <a:schemeClr val="bg1"/>
+                  <a:schemeClr val="bg1">
+                    <a:lumMod val="60000"/>
+                    <a:lumOff val="40000"/>
+                  </a:schemeClr>
                 </a:solidFill>
                 <a:effectLst>
                   <a:outerShdw blurRad="38100" dist="38100" dir="2700000" algn="tl">
@@ -15389,18 +15643,6 @@
               </a:rPr>
               <a:t>Извади</a:t>
             </a:r>
-            <a:endParaRPr lang="bg-BG" sz="2800" b="1" dirty="0">
-              <a:solidFill>
-                <a:schemeClr val="bg1"/>
-              </a:solidFill>
-              <a:effectLst>
-                <a:outerShdw blurRad="38100" dist="38100" dir="2700000" algn="tl">
-                  <a:srgbClr val="000000">
-                    <a:alpha val="43137"/>
-                  </a:srgbClr>
-                </a:outerShdw>
-              </a:effectLst>
-            </a:endParaRPr>
           </a:p>
         </p:txBody>
       </p:sp>
@@ -15464,7 +15706,7 @@
           <a:p>
             <a:pPr algn="ctr"/>
             <a:r>
-              <a:rPr lang="bg-BG" sz="2800" b="1" dirty="0" smtClean="0">
+              <a:rPr lang="bg-BG" sz="2800" b="1" dirty="0">
                 <a:solidFill>
                   <a:srgbClr val="FFFFFF"/>
                 </a:solidFill>
@@ -15479,7 +15721,7 @@
               <a:t>Или укажете от лентата с </a:t>
             </a:r>
             <a:r>
-              <a:rPr lang="bg-BG" sz="2800" b="1" dirty="0" smtClean="0">
+              <a:rPr lang="bg-BG" sz="2800" b="1" dirty="0">
                 <a:solidFill>
                   <a:schemeClr val="bg2"/>
                 </a:solidFill>
@@ -15494,7 +15736,7 @@
               <a:t>програмите</a:t>
             </a:r>
             <a:r>
-              <a:rPr lang="bg-BG" sz="2800" b="1" dirty="0" smtClean="0">
+              <a:rPr lang="bg-BG" sz="2800" b="1" dirty="0">
                 <a:solidFill>
                   <a:srgbClr val="FFFFFF"/>
                 </a:solidFill>
@@ -15509,9 +15751,12 @@
               <a:t> на </a:t>
             </a:r>
             <a:r>
-              <a:rPr lang="bg-BG" sz="2800" b="1" dirty="0" smtClean="0">
+              <a:rPr lang="bg-BG" sz="2800" b="1" dirty="0">
                 <a:solidFill>
-                  <a:schemeClr val="bg1"/>
+                  <a:schemeClr val="bg1">
+                    <a:lumMod val="60000"/>
+                    <a:lumOff val="40000"/>
+                  </a:schemeClr>
                 </a:solidFill>
                 <a:effectLst>
                   <a:outerShdw blurRad="38100" dist="38100" dir="2700000" algn="tl">
@@ -15523,18 +15768,6 @@
               </a:rPr>
               <a:t>фонов режим</a:t>
             </a:r>
-            <a:endParaRPr lang="bg-BG" sz="2800" b="1" dirty="0">
-              <a:solidFill>
-                <a:schemeClr val="bg1"/>
-              </a:solidFill>
-              <a:effectLst>
-                <a:outerShdw blurRad="38100" dist="38100" dir="2700000" algn="tl">
-                  <a:srgbClr val="000000">
-                    <a:alpha val="43137"/>
-                  </a:srgbClr>
-                </a:outerShdw>
-              </a:effectLst>
-            </a:endParaRPr>
           </a:p>
         </p:txBody>
       </p:sp>
@@ -17021,13 +17254,6 @@
       <p:transition spd="slow" advClick="0" advTm="5000"/>
     </mc:Fallback>
   </mc:AlternateContent>
-  <p:timing>
-    <p:tnLst>
-      <p:par>
-        <p:cTn id="1" dur="indefinite" restart="never" nodeType="tmRoot"/>
-      </p:par>
-    </p:tnLst>
-  </p:timing>
 </p:sld>
 </file>
 
@@ -17723,13 +17949,6 @@
       <p:transition spd="slow" advClick="0" advTm="5000"/>
     </mc:Fallback>
   </mc:AlternateContent>
-  <p:timing>
-    <p:tnLst>
-      <p:par>
-        <p:cTn id="1" dur="indefinite" restart="never" nodeType="tmRoot"/>
-      </p:par>
-    </p:tnLst>
-  </p:timing>
 </p:sld>
 </file>
 
@@ -17885,13 +18104,6 @@
       <p:transition spd="slow" advClick="0" advTm="5000"/>
     </mc:Fallback>
   </mc:AlternateContent>
-  <p:timing>
-    <p:tnLst>
-      <p:par>
-        <p:cTn id="1" dur="indefinite" restart="never" nodeType="tmRoot"/>
-      </p:par>
-    </p:tnLst>
-  </p:timing>
 </p:sld>
 </file>
 
@@ -17960,7 +18172,7 @@
         </p:nvSpPr>
         <p:spPr>
           <a:xfrm>
-            <a:off x="1818766" y="1313879"/>
+            <a:off x="2033178" y="1300231"/>
             <a:ext cx="9747645" cy="4564407"/>
           </a:xfrm>
         </p:spPr>
@@ -18001,11 +18213,7 @@
             </a:r>
             <a:r>
               <a:rPr lang="bg-BG" sz="3400" dirty="0"/>
-              <a:t>средство за трайно съхраняване на </a:t>
-            </a:r>
-            <a:r>
-              <a:rPr lang="bg-BG" sz="3400" dirty="0" smtClean="0"/>
-              <a:t>информация</a:t>
+              <a:t>средство за трайно съхраняване на информация</a:t>
             </a:r>
           </a:p>
           <a:p>
@@ -18015,7 +18223,7 @@
               </a:buClr>
             </a:pPr>
             <a:r>
-              <a:rPr lang="bg-BG" sz="3400" dirty="0" smtClean="0"/>
+              <a:rPr lang="bg-BG" sz="3400" dirty="0"/>
               <a:t>Служи за:</a:t>
             </a:r>
           </a:p>
@@ -18026,7 +18234,7 @@
               </a:buClr>
             </a:pPr>
             <a:r>
-              <a:rPr lang="bg-BG" sz="3200" b="1" dirty="0" smtClean="0">
+              <a:rPr lang="bg-BG" sz="3200" b="1" dirty="0">
                 <a:solidFill>
                   <a:schemeClr val="bg1"/>
                 </a:solidFill>
@@ -18034,7 +18242,7 @@
               <a:t>Съхраняване</a:t>
             </a:r>
             <a:r>
-              <a:rPr lang="bg-BG" sz="3200" dirty="0" smtClean="0"/>
+              <a:rPr lang="bg-BG" sz="3200" dirty="0"/>
               <a:t> на данните след изключване на компютъра</a:t>
             </a:r>
           </a:p>
@@ -18045,7 +18253,7 @@
               </a:buClr>
             </a:pPr>
             <a:r>
-              <a:rPr lang="bg-BG" sz="3200" b="1" dirty="0" smtClean="0">
+              <a:rPr lang="bg-BG" sz="3200" b="1" dirty="0">
                 <a:solidFill>
                   <a:schemeClr val="bg1"/>
                 </a:solidFill>
@@ -18053,7 +18261,7 @@
               <a:t>Прехвърляне</a:t>
             </a:r>
             <a:r>
-              <a:rPr lang="bg-BG" sz="3200" dirty="0" smtClean="0"/>
+              <a:rPr lang="bg-BG" sz="3200" dirty="0"/>
               <a:t> на информация към други компютри</a:t>
             </a:r>
           </a:p>
@@ -18064,10 +18272,9 @@
               </a:buClr>
             </a:pPr>
             <a:r>
-              <a:rPr lang="bg-BG" sz="3400" dirty="0" smtClean="0"/>
+              <a:rPr lang="bg-BG" sz="3400" dirty="0"/>
               <a:t>Съществуват различни технологични реализации</a:t>
             </a:r>
-            <a:endParaRPr lang="bg-BG" sz="3400" dirty="0"/>
           </a:p>
         </p:txBody>
       </p:sp>
@@ -18255,15 +18462,33 @@
                                   </p:childTnLst>
                                 </p:cTn>
                               </p:par>
+                            </p:childTnLst>
+                          </p:cTn>
+                        </p:par>
+                      </p:childTnLst>
+                    </p:cTn>
+                  </p:par>
+                  <p:par>
+                    <p:cTn id="13" fill="hold">
+                      <p:stCondLst>
+                        <p:cond delay="indefinite"/>
+                      </p:stCondLst>
+                      <p:childTnLst>
+                        <p:par>
+                          <p:cTn id="14" fill="hold">
+                            <p:stCondLst>
+                              <p:cond delay="0"/>
+                            </p:stCondLst>
+                            <p:childTnLst>
                               <p:par>
-                                <p:cTn id="13" presetID="1" presetClass="entr" presetSubtype="0" fill="hold" grpId="0" nodeType="withEffect">
+                                <p:cTn id="15" presetID="1" presetClass="entr" presetSubtype="0" fill="hold" grpId="0" nodeType="clickEffect">
                                   <p:stCondLst>
                                     <p:cond delay="0"/>
                                   </p:stCondLst>
                                   <p:childTnLst>
                                     <p:set>
                                       <p:cBhvr>
-                                        <p:cTn id="14" dur="1" fill="hold">
+                                        <p:cTn id="16" dur="1" fill="hold">
                                           <p:stCondLst>
                                             <p:cond delay="0"/>
                                           </p:stCondLst>
@@ -18293,26 +18518,26 @@
                     </p:cTn>
                   </p:par>
                   <p:par>
-                    <p:cTn id="15" fill="hold">
+                    <p:cTn id="17" fill="hold">
                       <p:stCondLst>
                         <p:cond delay="indefinite"/>
                       </p:stCondLst>
                       <p:childTnLst>
                         <p:par>
-                          <p:cTn id="16" fill="hold">
+                          <p:cTn id="18" fill="hold">
                             <p:stCondLst>
                               <p:cond delay="0"/>
                             </p:stCondLst>
                             <p:childTnLst>
                               <p:par>
-                                <p:cTn id="17" presetID="1" presetClass="entr" presetSubtype="0" fill="hold" grpId="0" nodeType="clickEffect">
+                                <p:cTn id="19" presetID="1" presetClass="entr" presetSubtype="0" fill="hold" grpId="0" nodeType="clickEffect">
                                   <p:stCondLst>
                                     <p:cond delay="0"/>
                                   </p:stCondLst>
                                   <p:childTnLst>
                                     <p:set>
                                       <p:cBhvr>
-                                        <p:cTn id="18" dur="1" fill="hold">
+                                        <p:cTn id="20" dur="1" fill="hold">
                                           <p:stCondLst>
                                             <p:cond delay="0"/>
                                           </p:stCondLst>
@@ -18363,7 +18588,7 @@
       </p:par>
     </p:tnLst>
     <p:bldLst>
-      <p:bldP spid="6" grpId="0" build="p"/>
+      <p:bldP spid="6" grpId="0" uiExpand="1" build="p"/>
     </p:bldLst>
   </p:timing>
 </p:sld>
@@ -19398,21 +19623,6 @@
               </a:rPr>
               <a:t>, </a:t>
             </a:r>
-            <a:r>
-              <a:rPr lang="en-US" sz="2800" b="1" dirty="0">
-                <a:solidFill>
-                  <a:srgbClr val="FFFFFF"/>
-                </a:solidFill>
-                <a:effectLst>
-                  <a:outerShdw blurRad="38100" dist="38100" dir="2700000" algn="tl">
-                    <a:srgbClr val="000000">
-                      <a:alpha val="43137"/>
-                    </a:srgbClr>
-                  </a:outerShdw>
-                </a:effectLst>
-              </a:rPr>
-              <a:t/>
-            </a:r>
             <a:br>
               <a:rPr lang="en-US" sz="2800" b="1" dirty="0">
                 <a:solidFill>
@@ -19518,21 +19728,6 @@
                 </a:effectLst>
               </a:rPr>
               <a:t>SSD,</a:t>
-            </a:r>
-            <a:r>
-              <a:rPr lang="bg-BG" sz="2800" b="1" dirty="0">
-                <a:solidFill>
-                  <a:srgbClr val="FFFFFF"/>
-                </a:solidFill>
-                <a:effectLst>
-                  <a:outerShdw blurRad="38100" dist="38100" dir="2700000" algn="tl">
-                    <a:srgbClr val="000000">
-                      <a:alpha val="43137"/>
-                    </a:srgbClr>
-                  </a:outerShdw>
-                </a:effectLst>
-              </a:rPr>
-              <a:t/>
             </a:r>
             <a:br>
               <a:rPr lang="bg-BG" sz="2800" b="1" dirty="0">
@@ -21251,13 +21446,6 @@
       <p:transition spd="slow" advClick="0" advTm="5000"/>
     </mc:Fallback>
   </mc:AlternateContent>
-  <p:timing>
-    <p:tnLst>
-      <p:par>
-        <p:cTn id="1" dur="indefinite" restart="never" nodeType="tmRoot"/>
-      </p:par>
-    </p:tnLst>
-  </p:timing>
 </p:sld>
 </file>
 

</xml_diff>